<commit_message>
Created second draft of the poster
This second draft is still text-heavy and might need to be cut down a bit to improve the readers' experience.
</commit_message>
<xml_diff>
--- a/poster/poster.pptx
+++ b/poster/poster.pptx
@@ -4,6 +4,9 @@
   <p:sldMasterIdLst>
     <p:sldMasterId id="2147483672" r:id="rId1"/>
   </p:sldMasterIdLst>
+  <p:notesMasterIdLst>
+    <p:notesMasterId r:id="rId3"/>
+  </p:notesMasterIdLst>
   <p:sldIdLst>
     <p:sldId id="256" r:id="rId2"/>
   </p:sldIdLst>
@@ -115,7 +118,7 @@
 <file path=ppt/revisionInfo.xml><?xml version="1.0" encoding="utf-8"?>
 <p1510:revInfo xmlns:a="http://schemas.openxmlformats.org/drawingml/2006/main" xmlns:r="http://schemas.openxmlformats.org/officeDocument/2006/relationships" xmlns:p1510="http://schemas.microsoft.com/office/powerpoint/2015/10/main">
   <p1510:revLst>
-    <p1510:client id="{57DA0EA2-C5F5-444B-9841-035F8C68153E}" v="10" dt="2022-04-14T10:46:49.420"/>
+    <p1510:client id="{57DA0EA2-C5F5-444B-9841-035F8C68153E}" v="39" dt="2022-04-17T19:52:08.976"/>
   </p1510:revLst>
 </p1510:revInfo>
 </file>
@@ -124,17 +127,33 @@
 <pc:chgInfo xmlns:a="http://schemas.openxmlformats.org/drawingml/2006/main" xmlns:r="http://schemas.openxmlformats.org/officeDocument/2006/relationships" xmlns:ac="http://schemas.microsoft.com/office/drawing/2013/main/command" xmlns:pc="http://schemas.microsoft.com/office/powerpoint/2013/main/command">
   <pc:docChgLst>
     <pc:chgData name="Talen VK, Vincent" userId="7a591fd1-38bf-40a7-8dc5-c7b4c67e7540" providerId="ADAL" clId="{57DA0EA2-C5F5-444B-9841-035F8C68153E}"/>
-    <pc:docChg chg="undo custSel modSld">
-      <pc:chgData name="Talen VK, Vincent" userId="7a591fd1-38bf-40a7-8dc5-c7b4c67e7540" providerId="ADAL" clId="{57DA0EA2-C5F5-444B-9841-035F8C68153E}" dt="2022-04-14T10:46:49.420" v="59"/>
+    <pc:docChg chg="undo redo custSel modSld">
+      <pc:chgData name="Talen VK, Vincent" userId="7a591fd1-38bf-40a7-8dc5-c7b4c67e7540" providerId="ADAL" clId="{57DA0EA2-C5F5-444B-9841-035F8C68153E}" dt="2022-04-17T19:53:02.769" v="1077" actId="14100"/>
       <pc:docMkLst>
         <pc:docMk/>
       </pc:docMkLst>
-      <pc:sldChg chg="modSp mod">
-        <pc:chgData name="Talen VK, Vincent" userId="7a591fd1-38bf-40a7-8dc5-c7b4c67e7540" providerId="ADAL" clId="{57DA0EA2-C5F5-444B-9841-035F8C68153E}" dt="2022-04-14T10:46:49.420" v="59"/>
+      <pc:sldChg chg="addSp delSp modSp mod">
+        <pc:chgData name="Talen VK, Vincent" userId="7a591fd1-38bf-40a7-8dc5-c7b4c67e7540" providerId="ADAL" clId="{57DA0EA2-C5F5-444B-9841-035F8C68153E}" dt="2022-04-17T19:53:02.769" v="1077" actId="14100"/>
         <pc:sldMkLst>
           <pc:docMk/>
           <pc:sldMk cId="870601871" sldId="256"/>
         </pc:sldMkLst>
+        <pc:spChg chg="add del">
+          <ac:chgData name="Talen VK, Vincent" userId="7a591fd1-38bf-40a7-8dc5-c7b4c67e7540" providerId="ADAL" clId="{57DA0EA2-C5F5-444B-9841-035F8C68153E}" dt="2022-04-17T17:25:13.142" v="198"/>
+          <ac:spMkLst>
+            <pc:docMk/>
+            <pc:sldMk cId="870601871" sldId="256"/>
+            <ac:spMk id="2" creationId="{48B3B9E9-FF3D-BE69-C2FA-3846AD6BFB8A}"/>
+          </ac:spMkLst>
+        </pc:spChg>
+        <pc:spChg chg="add del">
+          <ac:chgData name="Talen VK, Vincent" userId="7a591fd1-38bf-40a7-8dc5-c7b4c67e7540" providerId="ADAL" clId="{57DA0EA2-C5F5-444B-9841-035F8C68153E}" dt="2022-04-17T17:25:16.279" v="200"/>
+          <ac:spMkLst>
+            <pc:docMk/>
+            <pc:sldMk cId="870601871" sldId="256"/>
+            <ac:spMk id="3" creationId="{EAD26218-0D06-EB5B-A81B-596CCDAC1C5A}"/>
+          </ac:spMkLst>
+        </pc:spChg>
         <pc:spChg chg="mod">
           <ac:chgData name="Talen VK, Vincent" userId="7a591fd1-38bf-40a7-8dc5-c7b4c67e7540" providerId="ADAL" clId="{57DA0EA2-C5F5-444B-9841-035F8C68153E}" dt="2022-04-12T13:21:39.909" v="55" actId="20577"/>
           <ac:spMkLst>
@@ -143,8 +162,24 @@
             <ac:spMk id="12" creationId="{96397A83-FA71-0941-BCA8-9C7FA4733AAF}"/>
           </ac:spMkLst>
         </pc:spChg>
+        <pc:spChg chg="add mod">
+          <ac:chgData name="Talen VK, Vincent" userId="7a591fd1-38bf-40a7-8dc5-c7b4c67e7540" providerId="ADAL" clId="{57DA0EA2-C5F5-444B-9841-035F8C68153E}" dt="2022-04-17T19:26:54.351" v="1067" actId="123"/>
+          <ac:spMkLst>
+            <pc:docMk/>
+            <pc:sldMk cId="870601871" sldId="256"/>
+            <ac:spMk id="23" creationId="{F440FA86-47DB-06AB-F67F-1B6C0B8D8B19}"/>
+          </ac:spMkLst>
+        </pc:spChg>
         <pc:spChg chg="mod">
-          <ac:chgData name="Talen VK, Vincent" userId="7a591fd1-38bf-40a7-8dc5-c7b4c67e7540" providerId="ADAL" clId="{57DA0EA2-C5F5-444B-9841-035F8C68153E}" dt="2022-04-12T13:21:06.994" v="29" actId="20577"/>
+          <ac:chgData name="Talen VK, Vincent" userId="7a591fd1-38bf-40a7-8dc5-c7b4c67e7540" providerId="ADAL" clId="{57DA0EA2-C5F5-444B-9841-035F8C68153E}" dt="2022-04-17T16:36:49.768" v="151"/>
+          <ac:spMkLst>
+            <pc:docMk/>
+            <pc:sldMk cId="870601871" sldId="256"/>
+            <ac:spMk id="24" creationId="{DB57C340-6684-E940-9418-52FEBA8F3490}"/>
+          </ac:spMkLst>
+        </pc:spChg>
+        <pc:spChg chg="mod">
+          <ac:chgData name="Talen VK, Vincent" userId="7a591fd1-38bf-40a7-8dc5-c7b4c67e7540" providerId="ADAL" clId="{57DA0EA2-C5F5-444B-9841-035F8C68153E}" dt="2022-04-17T17:06:12.717" v="194" actId="20577"/>
           <ac:spMkLst>
             <pc:docMk/>
             <pc:sldMk cId="870601871" sldId="256"/>
@@ -152,25 +187,531 @@
           </ac:spMkLst>
         </pc:spChg>
         <pc:spChg chg="mod">
-          <ac:chgData name="Talen VK, Vincent" userId="7a591fd1-38bf-40a7-8dc5-c7b4c67e7540" providerId="ADAL" clId="{57DA0EA2-C5F5-444B-9841-035F8C68153E}" dt="2022-04-14T10:46:47.196" v="58"/>
+          <ac:chgData name="Talen VK, Vincent" userId="7a591fd1-38bf-40a7-8dc5-c7b4c67e7540" providerId="ADAL" clId="{57DA0EA2-C5F5-444B-9841-035F8C68153E}" dt="2022-04-17T17:04:47.090" v="186" actId="20577"/>
+          <ac:spMkLst>
+            <pc:docMk/>
+            <pc:sldMk cId="870601871" sldId="256"/>
+            <ac:spMk id="26" creationId="{0576A38A-1E38-284E-B986-04919A5B0EAD}"/>
+          </ac:spMkLst>
+        </pc:spChg>
+        <pc:spChg chg="add del mod">
+          <ac:chgData name="Talen VK, Vincent" userId="7a591fd1-38bf-40a7-8dc5-c7b4c67e7540" providerId="ADAL" clId="{57DA0EA2-C5F5-444B-9841-035F8C68153E}" dt="2022-04-17T18:27:32.211" v="1063" actId="20577"/>
           <ac:spMkLst>
             <pc:docMk/>
             <pc:sldMk cId="870601871" sldId="256"/>
             <ac:spMk id="30" creationId="{3E22E303-AA1A-7D4D-BE59-49E58C3E6595}"/>
           </ac:spMkLst>
         </pc:spChg>
+        <pc:spChg chg="add mod">
+          <ac:chgData name="Talen VK, Vincent" userId="7a591fd1-38bf-40a7-8dc5-c7b4c67e7540" providerId="ADAL" clId="{57DA0EA2-C5F5-444B-9841-035F8C68153E}" dt="2022-04-17T18:27:18.004" v="1061" actId="1076"/>
+          <ac:spMkLst>
+            <pc:docMk/>
+            <pc:sldMk cId="870601871" sldId="256"/>
+            <ac:spMk id="31" creationId="{5477BF27-057E-F3E2-38CD-3029C4A00289}"/>
+          </ac:spMkLst>
+        </pc:spChg>
         <pc:spChg chg="mod">
-          <ac:chgData name="Talen VK, Vincent" userId="7a591fd1-38bf-40a7-8dc5-c7b4c67e7540" providerId="ADAL" clId="{57DA0EA2-C5F5-444B-9841-035F8C68153E}" dt="2022-04-14T10:46:49.420" v="59"/>
+          <ac:chgData name="Talen VK, Vincent" userId="7a591fd1-38bf-40a7-8dc5-c7b4c67e7540" providerId="ADAL" clId="{57DA0EA2-C5F5-444B-9841-035F8C68153E}" dt="2022-04-17T19:53:02.769" v="1077" actId="14100"/>
           <ac:spMkLst>
             <pc:docMk/>
             <pc:sldMk cId="870601871" sldId="256"/>
             <ac:spMk id="34" creationId="{2A599E3B-E38B-4145-8C3C-426C114EDB27}"/>
           </ac:spMkLst>
         </pc:spChg>
+        <pc:picChg chg="add del mod">
+          <ac:chgData name="Talen VK, Vincent" userId="7a591fd1-38bf-40a7-8dc5-c7b4c67e7540" providerId="ADAL" clId="{57DA0EA2-C5F5-444B-9841-035F8C68153E}" dt="2022-04-17T17:29:55.204" v="210" actId="478"/>
+          <ac:picMkLst>
+            <pc:docMk/>
+            <pc:sldMk cId="870601871" sldId="256"/>
+            <ac:picMk id="5" creationId="{25010431-7BA3-1316-281A-8C727F4774B1}"/>
+          </ac:picMkLst>
+        </pc:picChg>
+        <pc:picChg chg="add mod">
+          <ac:chgData name="Talen VK, Vincent" userId="7a591fd1-38bf-40a7-8dc5-c7b4c67e7540" providerId="ADAL" clId="{57DA0EA2-C5F5-444B-9841-035F8C68153E}" dt="2022-04-17T18:23:55.200" v="964" actId="1076"/>
+          <ac:picMkLst>
+            <pc:docMk/>
+            <pc:sldMk cId="870601871" sldId="256"/>
+            <ac:picMk id="9" creationId="{C401E852-B681-AA82-8C7C-77F4E598D6CF}"/>
+          </ac:picMkLst>
+        </pc:picChg>
+        <pc:picChg chg="add del mod">
+          <ac:chgData name="Talen VK, Vincent" userId="7a591fd1-38bf-40a7-8dc5-c7b4c67e7540" providerId="ADAL" clId="{57DA0EA2-C5F5-444B-9841-035F8C68153E}" dt="2022-04-17T17:55:07.313" v="793" actId="478"/>
+          <ac:picMkLst>
+            <pc:docMk/>
+            <pc:sldMk cId="870601871" sldId="256"/>
+            <ac:picMk id="11" creationId="{C02F4298-2152-DFE9-935C-4A7E0672363F}"/>
+          </ac:picMkLst>
+        </pc:picChg>
+        <pc:picChg chg="add del mod">
+          <ac:chgData name="Talen VK, Vincent" userId="7a591fd1-38bf-40a7-8dc5-c7b4c67e7540" providerId="ADAL" clId="{57DA0EA2-C5F5-444B-9841-035F8C68153E}" dt="2022-04-17T17:30:01.871" v="213" actId="478"/>
+          <ac:picMkLst>
+            <pc:docMk/>
+            <pc:sldMk cId="870601871" sldId="256"/>
+            <ac:picMk id="14" creationId="{8BF9DA36-2A1B-93A6-2C17-435ABA337BEC}"/>
+          </ac:picMkLst>
+        </pc:picChg>
+        <pc:picChg chg="add del mod">
+          <ac:chgData name="Talen VK, Vincent" userId="7a591fd1-38bf-40a7-8dc5-c7b4c67e7540" providerId="ADAL" clId="{57DA0EA2-C5F5-444B-9841-035F8C68153E}" dt="2022-04-17T17:30:06.882" v="215" actId="478"/>
+          <ac:picMkLst>
+            <pc:docMk/>
+            <pc:sldMk cId="870601871" sldId="256"/>
+            <ac:picMk id="19" creationId="{98D58F48-27AE-60C7-3EAA-F9DBAF97B6C9}"/>
+          </ac:picMkLst>
+        </pc:picChg>
+        <pc:picChg chg="add del mod">
+          <ac:chgData name="Talen VK, Vincent" userId="7a591fd1-38bf-40a7-8dc5-c7b4c67e7540" providerId="ADAL" clId="{57DA0EA2-C5F5-444B-9841-035F8C68153E}" dt="2022-04-17T17:34:20.619" v="218" actId="478"/>
+          <ac:picMkLst>
+            <pc:docMk/>
+            <pc:sldMk cId="870601871" sldId="256"/>
+            <ac:picMk id="22" creationId="{5F240338-2E53-E3E8-7610-73B36965395A}"/>
+          </ac:picMkLst>
+        </pc:picChg>
+        <pc:picChg chg="add mod">
+          <ac:chgData name="Talen VK, Vincent" userId="7a591fd1-38bf-40a7-8dc5-c7b4c67e7540" providerId="ADAL" clId="{57DA0EA2-C5F5-444B-9841-035F8C68153E}" dt="2022-04-17T18:27:18.004" v="1061" actId="1076"/>
+          <ac:picMkLst>
+            <pc:docMk/>
+            <pc:sldMk cId="870601871" sldId="256"/>
+            <ac:picMk id="28" creationId="{1A7304ED-9D8D-577A-DB17-32DC4BC351A7}"/>
+          </ac:picMkLst>
+        </pc:picChg>
       </pc:sldChg>
     </pc:docChg>
   </pc:docChgLst>
 </pc:chgInfo>
+</file>
+
+<file path=ppt/notesMasters/notesMaster1.xml><?xml version="1.0" encoding="utf-8"?>
+<p:notesMaster xmlns:a="http://schemas.openxmlformats.org/drawingml/2006/main" xmlns:r="http://schemas.openxmlformats.org/officeDocument/2006/relationships" xmlns:p="http://schemas.openxmlformats.org/presentationml/2006/main">
+  <p:cSld>
+    <p:bg>
+      <p:bgRef idx="1001">
+        <a:schemeClr val="bg1"/>
+      </p:bgRef>
+    </p:bg>
+    <p:spTree>
+      <p:nvGrpSpPr>
+        <p:cNvPr id="1" name=""/>
+        <p:cNvGrpSpPr/>
+        <p:nvPr/>
+      </p:nvGrpSpPr>
+      <p:grpSpPr>
+        <a:xfrm>
+          <a:off x="0" y="0"/>
+          <a:ext cx="0" cy="0"/>
+          <a:chOff x="0" y="0"/>
+          <a:chExt cx="0" cy="0"/>
+        </a:xfrm>
+      </p:grpSpPr>
+      <p:sp>
+        <p:nvSpPr>
+          <p:cNvPr id="2" name="Header Placeholder 1"/>
+          <p:cNvSpPr>
+            <a:spLocks noGrp="1"/>
+          </p:cNvSpPr>
+          <p:nvPr>
+            <p:ph type="hdr" sz="quarter"/>
+          </p:nvPr>
+        </p:nvSpPr>
+        <p:spPr>
+          <a:xfrm>
+            <a:off x="0" y="0"/>
+            <a:ext cx="2971800" cy="458788"/>
+          </a:xfrm>
+          <a:prstGeom prst="rect">
+            <a:avLst/>
+          </a:prstGeom>
+        </p:spPr>
+        <p:txBody>
+          <a:bodyPr vert="horz" lIns="91440" tIns="45720" rIns="91440" bIns="45720" rtlCol="0"/>
+          <a:lstStyle>
+            <a:lvl1pPr algn="l">
+              <a:defRPr sz="1200"/>
+            </a:lvl1pPr>
+          </a:lstStyle>
+          <a:p>
+            <a:endParaRPr lang="en-NL"/>
+          </a:p>
+        </p:txBody>
+      </p:sp>
+      <p:sp>
+        <p:nvSpPr>
+          <p:cNvPr id="3" name="Date Placeholder 2"/>
+          <p:cNvSpPr>
+            <a:spLocks noGrp="1"/>
+          </p:cNvSpPr>
+          <p:nvPr>
+            <p:ph type="dt" idx="1"/>
+          </p:nvPr>
+        </p:nvSpPr>
+        <p:spPr>
+          <a:xfrm>
+            <a:off x="3884613" y="0"/>
+            <a:ext cx="2971800" cy="458788"/>
+          </a:xfrm>
+          <a:prstGeom prst="rect">
+            <a:avLst/>
+          </a:prstGeom>
+        </p:spPr>
+        <p:txBody>
+          <a:bodyPr vert="horz" lIns="91440" tIns="45720" rIns="91440" bIns="45720" rtlCol="0"/>
+          <a:lstStyle>
+            <a:lvl1pPr algn="r">
+              <a:defRPr sz="1200"/>
+            </a:lvl1pPr>
+          </a:lstStyle>
+          <a:p>
+            <a:fld id="{D17B2D2D-AA5E-E74E-B007-4BE5E79DB111}" type="datetimeFigureOut">
+              <a:rPr lang="en-NL" smtClean="0"/>
+              <a:t>17/04/2022</a:t>
+            </a:fld>
+            <a:endParaRPr lang="en-NL"/>
+          </a:p>
+        </p:txBody>
+      </p:sp>
+      <p:sp>
+        <p:nvSpPr>
+          <p:cNvPr id="4" name="Slide Image Placeholder 3"/>
+          <p:cNvSpPr>
+            <a:spLocks noGrp="1" noRot="1" noChangeAspect="1"/>
+          </p:cNvSpPr>
+          <p:nvPr>
+            <p:ph type="sldImg" idx="2"/>
+          </p:nvPr>
+        </p:nvSpPr>
+        <p:spPr>
+          <a:xfrm>
+            <a:off x="2338388" y="1143000"/>
+            <a:ext cx="2181225" cy="3086100"/>
+          </a:xfrm>
+          <a:prstGeom prst="rect">
+            <a:avLst/>
+          </a:prstGeom>
+          <a:noFill/>
+          <a:ln w="12700">
+            <a:solidFill>
+              <a:prstClr val="black"/>
+            </a:solidFill>
+          </a:ln>
+        </p:spPr>
+        <p:txBody>
+          <a:bodyPr vert="horz" lIns="91440" tIns="45720" rIns="91440" bIns="45720" rtlCol="0" anchor="ctr"/>
+          <a:lstStyle/>
+          <a:p>
+            <a:endParaRPr lang="en-NL"/>
+          </a:p>
+        </p:txBody>
+      </p:sp>
+      <p:sp>
+        <p:nvSpPr>
+          <p:cNvPr id="5" name="Notes Placeholder 4"/>
+          <p:cNvSpPr>
+            <a:spLocks noGrp="1"/>
+          </p:cNvSpPr>
+          <p:nvPr>
+            <p:ph type="body" sz="quarter" idx="3"/>
+          </p:nvPr>
+        </p:nvSpPr>
+        <p:spPr>
+          <a:xfrm>
+            <a:off x="685800" y="4400550"/>
+            <a:ext cx="5486400" cy="3600450"/>
+          </a:xfrm>
+          <a:prstGeom prst="rect">
+            <a:avLst/>
+          </a:prstGeom>
+        </p:spPr>
+        <p:txBody>
+          <a:bodyPr vert="horz" lIns="91440" tIns="45720" rIns="91440" bIns="45720" rtlCol="0"/>
+          <a:lstStyle/>
+          <a:p>
+            <a:pPr lvl="0"/>
+            <a:r>
+              <a:rPr lang="en-GB"/>
+              <a:t>Click to edit Master text styles</a:t>
+            </a:r>
+          </a:p>
+          <a:p>
+            <a:pPr lvl="1"/>
+            <a:r>
+              <a:rPr lang="en-GB"/>
+              <a:t>Second level</a:t>
+            </a:r>
+          </a:p>
+          <a:p>
+            <a:pPr lvl="2"/>
+            <a:r>
+              <a:rPr lang="en-GB"/>
+              <a:t>Third level</a:t>
+            </a:r>
+          </a:p>
+          <a:p>
+            <a:pPr lvl="3"/>
+            <a:r>
+              <a:rPr lang="en-GB"/>
+              <a:t>Fourth level</a:t>
+            </a:r>
+          </a:p>
+          <a:p>
+            <a:pPr lvl="4"/>
+            <a:r>
+              <a:rPr lang="en-GB"/>
+              <a:t>Fifth level</a:t>
+            </a:r>
+            <a:endParaRPr lang="en-NL"/>
+          </a:p>
+        </p:txBody>
+      </p:sp>
+      <p:sp>
+        <p:nvSpPr>
+          <p:cNvPr id="6" name="Footer Placeholder 5"/>
+          <p:cNvSpPr>
+            <a:spLocks noGrp="1"/>
+          </p:cNvSpPr>
+          <p:nvPr>
+            <p:ph type="ftr" sz="quarter" idx="4"/>
+          </p:nvPr>
+        </p:nvSpPr>
+        <p:spPr>
+          <a:xfrm>
+            <a:off x="0" y="8685213"/>
+            <a:ext cx="2971800" cy="458787"/>
+          </a:xfrm>
+          <a:prstGeom prst="rect">
+            <a:avLst/>
+          </a:prstGeom>
+        </p:spPr>
+        <p:txBody>
+          <a:bodyPr vert="horz" lIns="91440" tIns="45720" rIns="91440" bIns="45720" rtlCol="0" anchor="b"/>
+          <a:lstStyle>
+            <a:lvl1pPr algn="l">
+              <a:defRPr sz="1200"/>
+            </a:lvl1pPr>
+          </a:lstStyle>
+          <a:p>
+            <a:endParaRPr lang="en-NL"/>
+          </a:p>
+        </p:txBody>
+      </p:sp>
+      <p:sp>
+        <p:nvSpPr>
+          <p:cNvPr id="7" name="Slide Number Placeholder 6"/>
+          <p:cNvSpPr>
+            <a:spLocks noGrp="1"/>
+          </p:cNvSpPr>
+          <p:nvPr>
+            <p:ph type="sldNum" sz="quarter" idx="5"/>
+          </p:nvPr>
+        </p:nvSpPr>
+        <p:spPr>
+          <a:xfrm>
+            <a:off x="3884613" y="8685213"/>
+            <a:ext cx="2971800" cy="458787"/>
+          </a:xfrm>
+          <a:prstGeom prst="rect">
+            <a:avLst/>
+          </a:prstGeom>
+        </p:spPr>
+        <p:txBody>
+          <a:bodyPr vert="horz" lIns="91440" tIns="45720" rIns="91440" bIns="45720" rtlCol="0" anchor="b"/>
+          <a:lstStyle>
+            <a:lvl1pPr algn="r">
+              <a:defRPr sz="1200"/>
+            </a:lvl1pPr>
+          </a:lstStyle>
+          <a:p>
+            <a:fld id="{11233E59-BB51-2045-ACE7-2D4D4F45F224}" type="slidenum">
+              <a:rPr lang="en-NL" smtClean="0"/>
+              <a:t>‹#›</a:t>
+            </a:fld>
+            <a:endParaRPr lang="en-NL"/>
+          </a:p>
+        </p:txBody>
+      </p:sp>
+    </p:spTree>
+    <p:extLst>
+      <p:ext uri="{BB962C8B-B14F-4D97-AF65-F5344CB8AC3E}">
+        <p14:creationId xmlns:p14="http://schemas.microsoft.com/office/powerpoint/2010/main" val="4011853819"/>
+      </p:ext>
+    </p:extLst>
+  </p:cSld>
+  <p:clrMap bg1="lt1" tx1="dk1" bg2="lt2" tx2="dk2" accent1="accent1" accent2="accent2" accent3="accent3" accent4="accent4" accent5="accent5" accent6="accent6" hlink="hlink" folHlink="folHlink"/>
+  <p:notesStyle>
+    <a:lvl1pPr marL="0" algn="l" defTabSz="914400" rtl="0" eaLnBrk="1" latinLnBrk="0" hangingPunct="1">
+      <a:defRPr sz="1200" kern="1200">
+        <a:solidFill>
+          <a:schemeClr val="tx1"/>
+        </a:solidFill>
+        <a:latin typeface="+mn-lt"/>
+        <a:ea typeface="+mn-ea"/>
+        <a:cs typeface="+mn-cs"/>
+      </a:defRPr>
+    </a:lvl1pPr>
+    <a:lvl2pPr marL="457200" algn="l" defTabSz="914400" rtl="0" eaLnBrk="1" latinLnBrk="0" hangingPunct="1">
+      <a:defRPr sz="1200" kern="1200">
+        <a:solidFill>
+          <a:schemeClr val="tx1"/>
+        </a:solidFill>
+        <a:latin typeface="+mn-lt"/>
+        <a:ea typeface="+mn-ea"/>
+        <a:cs typeface="+mn-cs"/>
+      </a:defRPr>
+    </a:lvl2pPr>
+    <a:lvl3pPr marL="914400" algn="l" defTabSz="914400" rtl="0" eaLnBrk="1" latinLnBrk="0" hangingPunct="1">
+      <a:defRPr sz="1200" kern="1200">
+        <a:solidFill>
+          <a:schemeClr val="tx1"/>
+        </a:solidFill>
+        <a:latin typeface="+mn-lt"/>
+        <a:ea typeface="+mn-ea"/>
+        <a:cs typeface="+mn-cs"/>
+      </a:defRPr>
+    </a:lvl3pPr>
+    <a:lvl4pPr marL="1371600" algn="l" defTabSz="914400" rtl="0" eaLnBrk="1" latinLnBrk="0" hangingPunct="1">
+      <a:defRPr sz="1200" kern="1200">
+        <a:solidFill>
+          <a:schemeClr val="tx1"/>
+        </a:solidFill>
+        <a:latin typeface="+mn-lt"/>
+        <a:ea typeface="+mn-ea"/>
+        <a:cs typeface="+mn-cs"/>
+      </a:defRPr>
+    </a:lvl4pPr>
+    <a:lvl5pPr marL="1828800" algn="l" defTabSz="914400" rtl="0" eaLnBrk="1" latinLnBrk="0" hangingPunct="1">
+      <a:defRPr sz="1200" kern="1200">
+        <a:solidFill>
+          <a:schemeClr val="tx1"/>
+        </a:solidFill>
+        <a:latin typeface="+mn-lt"/>
+        <a:ea typeface="+mn-ea"/>
+        <a:cs typeface="+mn-cs"/>
+      </a:defRPr>
+    </a:lvl5pPr>
+    <a:lvl6pPr marL="2286000" algn="l" defTabSz="914400" rtl="0" eaLnBrk="1" latinLnBrk="0" hangingPunct="1">
+      <a:defRPr sz="1200" kern="1200">
+        <a:solidFill>
+          <a:schemeClr val="tx1"/>
+        </a:solidFill>
+        <a:latin typeface="+mn-lt"/>
+        <a:ea typeface="+mn-ea"/>
+        <a:cs typeface="+mn-cs"/>
+      </a:defRPr>
+    </a:lvl6pPr>
+    <a:lvl7pPr marL="2743200" algn="l" defTabSz="914400" rtl="0" eaLnBrk="1" latinLnBrk="0" hangingPunct="1">
+      <a:defRPr sz="1200" kern="1200">
+        <a:solidFill>
+          <a:schemeClr val="tx1"/>
+        </a:solidFill>
+        <a:latin typeface="+mn-lt"/>
+        <a:ea typeface="+mn-ea"/>
+        <a:cs typeface="+mn-cs"/>
+      </a:defRPr>
+    </a:lvl7pPr>
+    <a:lvl8pPr marL="3200400" algn="l" defTabSz="914400" rtl="0" eaLnBrk="1" latinLnBrk="0" hangingPunct="1">
+      <a:defRPr sz="1200" kern="1200">
+        <a:solidFill>
+          <a:schemeClr val="tx1"/>
+        </a:solidFill>
+        <a:latin typeface="+mn-lt"/>
+        <a:ea typeface="+mn-ea"/>
+        <a:cs typeface="+mn-cs"/>
+      </a:defRPr>
+    </a:lvl8pPr>
+    <a:lvl9pPr marL="3657600" algn="l" defTabSz="914400" rtl="0" eaLnBrk="1" latinLnBrk="0" hangingPunct="1">
+      <a:defRPr sz="1200" kern="1200">
+        <a:solidFill>
+          <a:schemeClr val="tx1"/>
+        </a:solidFill>
+        <a:latin typeface="+mn-lt"/>
+        <a:ea typeface="+mn-ea"/>
+        <a:cs typeface="+mn-cs"/>
+      </a:defRPr>
+    </a:lvl9pPr>
+  </p:notesStyle>
+</p:notesMaster>
+</file>
+
+<file path=ppt/notesSlides/notesSlide1.xml><?xml version="1.0" encoding="utf-8"?>
+<p:notes xmlns:a="http://schemas.openxmlformats.org/drawingml/2006/main" xmlns:r="http://schemas.openxmlformats.org/officeDocument/2006/relationships" xmlns:p="http://schemas.openxmlformats.org/presentationml/2006/main">
+  <p:cSld>
+    <p:spTree>
+      <p:nvGrpSpPr>
+        <p:cNvPr id="1" name=""/>
+        <p:cNvGrpSpPr/>
+        <p:nvPr/>
+      </p:nvGrpSpPr>
+      <p:grpSpPr>
+        <a:xfrm>
+          <a:off x="0" y="0"/>
+          <a:ext cx="0" cy="0"/>
+          <a:chOff x="0" y="0"/>
+          <a:chExt cx="0" cy="0"/>
+        </a:xfrm>
+      </p:grpSpPr>
+      <p:sp>
+        <p:nvSpPr>
+          <p:cNvPr id="2" name="Slide Image Placeholder 1"/>
+          <p:cNvSpPr>
+            <a:spLocks noGrp="1" noRot="1" noChangeAspect="1"/>
+          </p:cNvSpPr>
+          <p:nvPr>
+            <p:ph type="sldImg"/>
+          </p:nvPr>
+        </p:nvSpPr>
+        <p:spPr/>
+      </p:sp>
+      <p:sp>
+        <p:nvSpPr>
+          <p:cNvPr id="3" name="Notes Placeholder 2"/>
+          <p:cNvSpPr>
+            <a:spLocks noGrp="1"/>
+          </p:cNvSpPr>
+          <p:nvPr>
+            <p:ph type="body" idx="1"/>
+          </p:nvPr>
+        </p:nvSpPr>
+        <p:spPr/>
+        <p:txBody>
+          <a:bodyPr/>
+          <a:lstStyle/>
+          <a:p>
+            <a:endParaRPr lang="en-NL" dirty="0"/>
+          </a:p>
+        </p:txBody>
+      </p:sp>
+      <p:sp>
+        <p:nvSpPr>
+          <p:cNvPr id="4" name="Slide Number Placeholder 3"/>
+          <p:cNvSpPr>
+            <a:spLocks noGrp="1"/>
+          </p:cNvSpPr>
+          <p:nvPr>
+            <p:ph type="sldNum" sz="quarter" idx="5"/>
+          </p:nvPr>
+        </p:nvSpPr>
+        <p:spPr/>
+        <p:txBody>
+          <a:bodyPr/>
+          <a:lstStyle/>
+          <a:p>
+            <a:fld id="{11233E59-BB51-2045-ACE7-2D4D4F45F224}" type="slidenum">
+              <a:rPr lang="en-NL" smtClean="0"/>
+              <a:t>1</a:t>
+            </a:fld>
+            <a:endParaRPr lang="en-NL"/>
+          </a:p>
+        </p:txBody>
+      </p:sp>
+    </p:spTree>
+    <p:extLst>
+      <p:ext uri="{BB962C8B-B14F-4D97-AF65-F5344CB8AC3E}">
+        <p14:creationId xmlns:p14="http://schemas.microsoft.com/office/powerpoint/2010/main" val="3665329374"/>
+      </p:ext>
+    </p:extLst>
+  </p:cSld>
+  <p:clrMapOvr>
+    <a:masterClrMapping/>
+  </p:clrMapOvr>
+</p:notes>
 </file>
 
 <file path=ppt/slideLayouts/slideLayout1.xml><?xml version="1.0" encoding="utf-8"?>
@@ -304,7 +845,7 @@
           <a:p>
             <a:fld id="{3F1A2556-9B38-DC43-8BF2-565CEB700637}" type="datetimeFigureOut">
               <a:rPr lang="en-NL" smtClean="0"/>
-              <a:t>14/04/2022</a:t>
+              <a:t>17/04/2022</a:t>
             </a:fld>
             <a:endParaRPr lang="en-NL"/>
           </a:p>
@@ -474,7 +1015,7 @@
           <a:p>
             <a:fld id="{3F1A2556-9B38-DC43-8BF2-565CEB700637}" type="datetimeFigureOut">
               <a:rPr lang="en-NL" smtClean="0"/>
-              <a:t>14/04/2022</a:t>
+              <a:t>17/04/2022</a:t>
             </a:fld>
             <a:endParaRPr lang="en-NL"/>
           </a:p>
@@ -654,7 +1195,7 @@
           <a:p>
             <a:fld id="{3F1A2556-9B38-DC43-8BF2-565CEB700637}" type="datetimeFigureOut">
               <a:rPr lang="en-NL" smtClean="0"/>
-              <a:t>14/04/2022</a:t>
+              <a:t>17/04/2022</a:t>
             </a:fld>
             <a:endParaRPr lang="en-NL"/>
           </a:p>
@@ -824,7 +1365,7 @@
           <a:p>
             <a:fld id="{3F1A2556-9B38-DC43-8BF2-565CEB700637}" type="datetimeFigureOut">
               <a:rPr lang="en-NL" smtClean="0"/>
-              <a:t>14/04/2022</a:t>
+              <a:t>17/04/2022</a:t>
             </a:fld>
             <a:endParaRPr lang="en-NL"/>
           </a:p>
@@ -1068,7 +1609,7 @@
           <a:p>
             <a:fld id="{3F1A2556-9B38-DC43-8BF2-565CEB700637}" type="datetimeFigureOut">
               <a:rPr lang="en-NL" smtClean="0"/>
-              <a:t>14/04/2022</a:t>
+              <a:t>17/04/2022</a:t>
             </a:fld>
             <a:endParaRPr lang="en-NL"/>
           </a:p>
@@ -1300,7 +1841,7 @@
           <a:p>
             <a:fld id="{3F1A2556-9B38-DC43-8BF2-565CEB700637}" type="datetimeFigureOut">
               <a:rPr lang="en-NL" smtClean="0"/>
-              <a:t>14/04/2022</a:t>
+              <a:t>17/04/2022</a:t>
             </a:fld>
             <a:endParaRPr lang="en-NL"/>
           </a:p>
@@ -1667,7 +2208,7 @@
           <a:p>
             <a:fld id="{3F1A2556-9B38-DC43-8BF2-565CEB700637}" type="datetimeFigureOut">
               <a:rPr lang="en-NL" smtClean="0"/>
-              <a:t>14/04/2022</a:t>
+              <a:t>17/04/2022</a:t>
             </a:fld>
             <a:endParaRPr lang="en-NL"/>
           </a:p>
@@ -1785,7 +2326,7 @@
           <a:p>
             <a:fld id="{3F1A2556-9B38-DC43-8BF2-565CEB700637}" type="datetimeFigureOut">
               <a:rPr lang="en-NL" smtClean="0"/>
-              <a:t>14/04/2022</a:t>
+              <a:t>17/04/2022</a:t>
             </a:fld>
             <a:endParaRPr lang="en-NL"/>
           </a:p>
@@ -1880,7 +2421,7 @@
           <a:p>
             <a:fld id="{3F1A2556-9B38-DC43-8BF2-565CEB700637}" type="datetimeFigureOut">
               <a:rPr lang="en-NL" smtClean="0"/>
-              <a:t>14/04/2022</a:t>
+              <a:t>17/04/2022</a:t>
             </a:fld>
             <a:endParaRPr lang="en-NL"/>
           </a:p>
@@ -2157,7 +2698,7 @@
           <a:p>
             <a:fld id="{3F1A2556-9B38-DC43-8BF2-565CEB700637}" type="datetimeFigureOut">
               <a:rPr lang="en-NL" smtClean="0"/>
-              <a:t>14/04/2022</a:t>
+              <a:t>17/04/2022</a:t>
             </a:fld>
             <a:endParaRPr lang="en-NL"/>
           </a:p>
@@ -2414,7 +2955,7 @@
           <a:p>
             <a:fld id="{3F1A2556-9B38-DC43-8BF2-565CEB700637}" type="datetimeFigureOut">
               <a:rPr lang="en-NL" smtClean="0"/>
-              <a:t>14/04/2022</a:t>
+              <a:t>17/04/2022</a:t>
             </a:fld>
             <a:endParaRPr lang="en-NL"/>
           </a:p>
@@ -2627,7 +3168,7 @@
           <a:p>
             <a:fld id="{3F1A2556-9B38-DC43-8BF2-565CEB700637}" type="datetimeFigureOut">
               <a:rPr lang="en-NL" smtClean="0"/>
-              <a:t>14/04/2022</a:t>
+              <a:t>17/04/2022</a:t>
             </a:fld>
             <a:endParaRPr lang="en-NL"/>
           </a:p>
@@ -3153,7 +3694,7 @@
                 <a:latin typeface="Helvetica Neue" panose="02000503000000020004" pitchFamily="2" charset="0"/>
                 <a:ea typeface="Helvetica Neue" panose="02000503000000020004" pitchFamily="2" charset="0"/>
                 <a:cs typeface="Helvetica Neue" panose="02000503000000020004" pitchFamily="2" charset="0"/>
-                <a:hlinkClick r:id="rId2">
+                <a:hlinkClick r:id="rId3">
                   <a:extLst>
                     <a:ext uri="{A12FA001-AC4F-418D-AE19-62706E023703}">
                       <ahyp:hlinkClr xmlns:ahyp="http://schemas.microsoft.com/office/drawing/2018/hyperlinkcolor" val="tx"/>
@@ -3172,7 +3713,7 @@
                 <a:ea typeface="Helvetica Neue" panose="02000503000000020004" pitchFamily="2" charset="0"/>
                 <a:cs typeface="Helvetica Neue" panose="02000503000000020004" pitchFamily="2" charset="0"/>
               </a:rPr>
-              <a:t>. [Accessed: 08-Apr-2022].</a:t>
+              <a:t>. [Accessed: 11-Mar-2022].</a:t>
             </a:r>
           </a:p>
           <a:p>
@@ -3195,7 +3736,7 @@
                 <a:ea typeface="Helvetica Neue" panose="02000503000000020004" pitchFamily="2" charset="0"/>
                 <a:cs typeface="Helvetica Neue" panose="02000503000000020004" pitchFamily="2" charset="0"/>
               </a:rPr>
-              <a:t>[2] “</a:t>
+              <a:t>[2] “NCBI </a:t>
             </a:r>
             <a:r>
               <a:rPr lang="en-GB" sz="2000" i="1" noProof="1">
@@ -3227,7 +3768,7 @@
                 <a:latin typeface="Helvetica Neue" panose="02000503000000020004" pitchFamily="2" charset="0"/>
                 <a:ea typeface="Helvetica Neue" panose="02000503000000020004" pitchFamily="2" charset="0"/>
                 <a:cs typeface="Helvetica Neue" panose="02000503000000020004" pitchFamily="2" charset="0"/>
-                <a:hlinkClick r:id="rId2">
+                <a:hlinkClick r:id="rId3">
                   <a:extLst>
                     <a:ext uri="{A12FA001-AC4F-418D-AE19-62706E023703}">
                       <ahyp:hlinkClr xmlns:ahyp="http://schemas.microsoft.com/office/drawing/2018/hyperlinkcolor" val="tx"/>
@@ -3246,7 +3787,7 @@
                 <a:ea typeface="Helvetica Neue" panose="02000503000000020004" pitchFamily="2" charset="0"/>
                 <a:cs typeface="Helvetica Neue" panose="02000503000000020004" pitchFamily="2" charset="0"/>
               </a:rPr>
-              <a:t>. [Accessed: 08-Apr-2022].</a:t>
+              <a:t>. [Accessed: 11-Mar-2022].</a:t>
             </a:r>
             <a:endParaRPr lang="en-GB" noProof="1">
               <a:solidFill>
@@ -3484,10 +4025,10 @@
           <p:nvPr/>
         </p:nvPicPr>
         <p:blipFill>
-          <a:blip r:embed="rId3">
+          <a:blip r:embed="rId4">
             <a:extLst>
               <a:ext uri="{96DAC541-7B7A-43D3-8B79-37D633B846F1}">
-                <asvg:svgBlip xmlns:asvg="http://schemas.microsoft.com/office/drawing/2016/SVG/main" r:embed="rId4"/>
+                <asvg:svgBlip xmlns:asvg="http://schemas.microsoft.com/office/drawing/2016/SVG/main" r:embed="rId5"/>
               </a:ext>
             </a:extLst>
           </a:blip>
@@ -3632,41 +4173,60 @@
             </a:endParaRPr>
           </a:p>
           <a:p>
-            <a:r>
-              <a:rPr lang="en-GB" sz="3200" noProof="1">
+            <a:pPr algn="just"/>
+            <a:r>
+              <a:rPr lang="en-GB" sz="3200" dirty="0">
                 <a:latin typeface="Helvetica Neue" panose="02000503000000020004" pitchFamily="2" charset="0"/>
                 <a:ea typeface="Helvetica Neue" panose="02000503000000020004" pitchFamily="2" charset="0"/>
                 <a:cs typeface="Helvetica Neue" panose="02000503000000020004" pitchFamily="2" charset="0"/>
               </a:rPr>
-              <a:t>Noise Induced Hearing Loss is called the primary cause of acquired hearing loss in the industrial world. The cochlea is the part of the inner ear that converts mechanical vibrations into nerve impulses and transmits them to the brain, it houses a lot of the important central units contributing to hearing. </a:t>
-            </a:r>
-          </a:p>
-          <a:p>
-            <a:r>
-              <a:rPr lang="en-GB" sz="3200" noProof="1">
+              <a:t>Exposure to loud noise can cause hearing sensitivity or hearing loss, the intensity and duration of the exposure determines whether the hearing loss is temporary or permanent. Despite these clear physiological definitions, what’s lacking is a comprehensive understanding of the complex molecular mechanisms responsible for noise-induced threshold elevation and the processes responsible for hearing threshold recovery. </a:t>
+            </a:r>
+          </a:p>
+          <a:p>
+            <a:pPr algn="just"/>
+            <a:br>
+              <a:rPr lang="en-GB" sz="3200" dirty="0">
                 <a:latin typeface="Helvetica Neue" panose="02000503000000020004" pitchFamily="2" charset="0"/>
                 <a:ea typeface="Helvetica Neue" panose="02000503000000020004" pitchFamily="2" charset="0"/>
                 <a:cs typeface="Helvetica Neue" panose="02000503000000020004" pitchFamily="2" charset="0"/>
               </a:rPr>
-              <a:t>The chosen research focuses on the effects of exposure to different noise levels in mice to gain a deeper understanding about how sound affects hearing since clear physiological definitions are known about the causes of hearing sensitivity and hearing loss, but it is not known is a comprehensive understanding of the complex molecular mechanisms responsible for noise-induced threshold elevation and the processes responsible for hearing threshold recovery. </a:t>
-            </a:r>
-          </a:p>
-          <a:p>
+            </a:br>
+            <a:r>
+              <a:rPr lang="en-GB" sz="3200" dirty="0">
+                <a:latin typeface="Helvetica Neue" panose="02000503000000020004" pitchFamily="2" charset="0"/>
+                <a:ea typeface="Helvetica Neue" panose="02000503000000020004" pitchFamily="2" charset="0"/>
+                <a:cs typeface="Helvetica Neue" panose="02000503000000020004" pitchFamily="2" charset="0"/>
+              </a:rPr>
+              <a:t>The aim of the chosen research [1] was to obtain a deep understanding of the mechanisms contributing to NIHL, and in particular cochlear synaptopathy, since this could accelerate the ability to develop strategies for prevention and treatment. Multiple experiments were performed using the cochlea of mice that were exposed to different sound pressure levels (SPL), e.g. performing hearing tests to measure the recovery over time, comparing the cochlear proteome to spot changes in proteins, physical inspections and more. The cochlea is the part of the inner ear that converts mechanical vibrations into nerve impulses and transmits them to the brain, it houses a lot of the important central units contributing to hearing.</a:t>
+            </a:r>
+            <a:br>
+              <a:rPr lang="en-GB" sz="3200" dirty="0">
+                <a:latin typeface="Helvetica Neue" panose="02000503000000020004" pitchFamily="2" charset="0"/>
+                <a:ea typeface="Helvetica Neue" panose="02000503000000020004" pitchFamily="2" charset="0"/>
+                <a:cs typeface="Helvetica Neue" panose="02000503000000020004" pitchFamily="2" charset="0"/>
+              </a:rPr>
+            </a:br>
+            <a:br>
+              <a:rPr lang="en-GB" sz="3200" dirty="0">
+                <a:latin typeface="Helvetica Neue" panose="02000503000000020004" pitchFamily="2" charset="0"/>
+                <a:ea typeface="Helvetica Neue" panose="02000503000000020004" pitchFamily="2" charset="0"/>
+                <a:cs typeface="Helvetica Neue" panose="02000503000000020004" pitchFamily="2" charset="0"/>
+              </a:rPr>
+            </a:br>
+            <a:r>
+              <a:rPr lang="en-GB" sz="3200" dirty="0">
+                <a:latin typeface="Helvetica Neue" panose="02000503000000020004" pitchFamily="2" charset="0"/>
+                <a:ea typeface="Helvetica Neue" panose="02000503000000020004" pitchFamily="2" charset="0"/>
+                <a:cs typeface="Helvetica Neue" panose="02000503000000020004" pitchFamily="2" charset="0"/>
+              </a:rPr>
+              <a:t>The goal of this project is to try to replicate one of the experiments that was done as part of the chosen research; the RNA-sequencing analysis of gene expression in cochlea.</a:t>
+            </a:r>
             <a:endParaRPr lang="en-GB" sz="3200" noProof="1">
               <a:latin typeface="Helvetica Neue" panose="02000503000000020004" pitchFamily="2" charset="0"/>
               <a:ea typeface="Helvetica Neue" panose="02000503000000020004" pitchFamily="2" charset="0"/>
               <a:cs typeface="Helvetica Neue" panose="02000503000000020004" pitchFamily="2" charset="0"/>
             </a:endParaRPr>
-          </a:p>
-          <a:p>
-            <a:r>
-              <a:rPr lang="en-GB" sz="3200" noProof="1">
-                <a:latin typeface="Helvetica Neue" panose="02000503000000020004" pitchFamily="2" charset="0"/>
-                <a:ea typeface="Helvetica Neue" panose="02000503000000020004" pitchFamily="2" charset="0"/>
-                <a:cs typeface="Helvetica Neue" panose="02000503000000020004" pitchFamily="2" charset="0"/>
-              </a:rPr>
-              <a:t>A multitude of experiments were performed by the chosen research but for this project the bioinformatics experiment about gene expression was done.</a:t>
-            </a:r>
           </a:p>
         </p:txBody>
       </p:sp>
@@ -3726,13 +4286,52 @@
             </a:endParaRPr>
           </a:p>
           <a:p>
+            <a:pPr algn="just"/>
             <a:r>
               <a:rPr lang="en-GB" sz="3200" noProof="1">
                 <a:latin typeface="Helvetica Neue" panose="02000503000000020004" pitchFamily="2" charset="0"/>
                 <a:ea typeface="Helvetica Neue" panose="02000503000000020004" pitchFamily="2" charset="0"/>
                 <a:cs typeface="Helvetica Neue" panose="02000503000000020004" pitchFamily="2" charset="0"/>
               </a:rPr>
-              <a:t>Text text text text text text text text text text text text text text text text text text text text text text text text text text text text text text text text text text text text text text text text text text text text text text text text text text text text text text text text text text text text text text text text text text text text text text text text text text text text text text text text text text text text text text text text text text text text text text text text text text text text text text text text text text text text text text text text text text text text text text text text text text text text text text text text text text text text text text text text text text text text text text text text text text text text text text text text text text text text text text text text text text text text text text text text text text text text text text text text text text text text text text text text text text text text text text text text text text text text text text text text text text text text text text text text text text text text text text text text text text text text text text text text text text text text text text text text text text text text text text </a:t>
+              <a:t>60-day old awake mice (Mus Musculus) were exposed to 70, 94 and 105dB SPL for 30 minutes, immediately after noise exposure the cochlea were removed, RNA was harvested with Trizol reagent and the RNA libraries were sequenced with the Illumina NovaSeq 6000. The resulting count data has 3 groups each with 4 replicates and is publicly available as a single file in the NCBI Gene Expression Omnibus [2].</a:t>
+            </a:r>
+          </a:p>
+          <a:p>
+            <a:pPr algn="just"/>
+            <a:endParaRPr lang="en-GB" sz="3200" noProof="1">
+              <a:latin typeface="Helvetica Neue" panose="02000503000000020004" pitchFamily="2" charset="0"/>
+              <a:ea typeface="Helvetica Neue" panose="02000503000000020004" pitchFamily="2" charset="0"/>
+              <a:cs typeface="Helvetica Neue" panose="02000503000000020004" pitchFamily="2" charset="0"/>
+            </a:endParaRPr>
+          </a:p>
+          <a:p>
+            <a:pPr algn="just"/>
+            <a:r>
+              <a:rPr lang="en-GB" sz="3200" noProof="1">
+                <a:latin typeface="Helvetica Neue" panose="02000503000000020004" pitchFamily="2" charset="0"/>
+                <a:ea typeface="Helvetica Neue" panose="02000503000000020004" pitchFamily="2" charset="0"/>
+                <a:cs typeface="Helvetica Neue" panose="02000503000000020004" pitchFamily="2" charset="0"/>
+              </a:rPr>
+              <a:t>To perform the statistical analysis and find differentially expressed genes (DEGs), the R programming language was used in RStudio to create an R Markdown file. First the quality and structure of the data was assessed by plotting a few key visuals, after which was concluded that all samples were sufficient and nothing had to be directly done to them. Genes with low counts were filtered and using the Bioconductor package edgeR the actual analysis was performed.</a:t>
+            </a:r>
+          </a:p>
+          <a:p>
+            <a:pPr algn="just"/>
+            <a:endParaRPr lang="en-GB" sz="3200" noProof="1">
+              <a:latin typeface="Helvetica Neue" panose="02000503000000020004" pitchFamily="2" charset="0"/>
+              <a:ea typeface="Helvetica Neue" panose="02000503000000020004" pitchFamily="2" charset="0"/>
+              <a:cs typeface="Helvetica Neue" panose="02000503000000020004" pitchFamily="2" charset="0"/>
+            </a:endParaRPr>
+          </a:p>
+          <a:p>
+            <a:pPr algn="just"/>
+            <a:r>
+              <a:rPr lang="en-GB" sz="3200" noProof="1">
+                <a:latin typeface="Helvetica Neue" panose="02000503000000020004" pitchFamily="2" charset="0"/>
+                <a:ea typeface="Helvetica Neue" panose="02000503000000020004" pitchFamily="2" charset="0"/>
+                <a:cs typeface="Helvetica Neue" panose="02000503000000020004" pitchFamily="2" charset="0"/>
+              </a:rPr>
+              <a:t>The data was normalized using edgeR's TMM (Trimmed Mean of M-values) normalization method, resulting P-values were adjusted using Benjamini and Hochberg’s approach. Genes with an adjusted P value &lt; 0.05 and fold change &gt; 1.5 found by edgeR were assigned as differentially expressed genes.</a:t>
             </a:r>
           </a:p>
         </p:txBody>
@@ -3752,7 +4351,7 @@
         <p:spPr>
           <a:xfrm>
             <a:off x="12761999" y="5432400"/>
-            <a:ext cx="16361213" cy="15915482"/>
+            <a:ext cx="16361213" cy="23466796"/>
           </a:xfrm>
           <a:prstGeom prst="rect">
             <a:avLst/>
@@ -3793,13 +4392,324 @@
             </a:endParaRPr>
           </a:p>
           <a:p>
+            <a:pPr algn="just"/>
             <a:r>
               <a:rPr lang="en-GB" sz="3200" noProof="1">
                 <a:latin typeface="Helvetica Neue" panose="02000503000000020004" pitchFamily="2" charset="0"/>
                 <a:ea typeface="Helvetica Neue" panose="02000503000000020004" pitchFamily="2" charset="0"/>
                 <a:cs typeface="Helvetica Neue" panose="02000503000000020004" pitchFamily="2" charset="0"/>
               </a:rPr>
-              <a:t>Text text text text text text text text text text text text text text text text text text text text text text text text text text text text text text text text text text text text text text text text text text text text text text text text text text text text text text text text text text text text text text text text text text text text text text text text text text text text text text text text text text text text text text text text text text text text text text text text text text text text text text text text text text text text text text text text text text text text text text text text text text text text text text text text text text text text text text text text text text text text text text text text text text text text text text text text text text text text text text text text text text text text text text text text text text text text text text text text text text text text text text text text text text text text text text text text text text text text text text text text text text text text text text text text text text text text text text text text text text text text text text text text text text text text text text text text text text text text text text </a:t>
+              <a:t>Using the edgeR library, comparisons between sample groups and statistical tests were done, resulting in data sets with o.a. p-values and fold change (FC) values for the genes. The resulting data sets were visualized in volcano plots, highlighting the genes considered DEGs by implementing the p-value and FC thresholds (Figure 1).</a:t>
+            </a:r>
+          </a:p>
+          <a:p>
+            <a:pPr algn="just"/>
+            <a:endParaRPr lang="en-GB" sz="3200" noProof="1">
+              <a:latin typeface="Helvetica Neue" panose="02000503000000020004" pitchFamily="2" charset="0"/>
+              <a:ea typeface="Helvetica Neue" panose="02000503000000020004" pitchFamily="2" charset="0"/>
+              <a:cs typeface="Helvetica Neue" panose="02000503000000020004" pitchFamily="2" charset="0"/>
+            </a:endParaRPr>
+          </a:p>
+          <a:p>
+            <a:pPr algn="just"/>
+            <a:endParaRPr lang="en-GB" sz="3200" noProof="1">
+              <a:latin typeface="Helvetica Neue" panose="02000503000000020004" pitchFamily="2" charset="0"/>
+              <a:ea typeface="Helvetica Neue" panose="02000503000000020004" pitchFamily="2" charset="0"/>
+              <a:cs typeface="Helvetica Neue" panose="02000503000000020004" pitchFamily="2" charset="0"/>
+            </a:endParaRPr>
+          </a:p>
+          <a:p>
+            <a:pPr algn="just"/>
+            <a:endParaRPr lang="en-GB" sz="3200" noProof="1">
+              <a:latin typeface="Helvetica Neue" panose="02000503000000020004" pitchFamily="2" charset="0"/>
+              <a:ea typeface="Helvetica Neue" panose="02000503000000020004" pitchFamily="2" charset="0"/>
+              <a:cs typeface="Helvetica Neue" panose="02000503000000020004" pitchFamily="2" charset="0"/>
+            </a:endParaRPr>
+          </a:p>
+          <a:p>
+            <a:pPr algn="just"/>
+            <a:endParaRPr lang="en-GB" sz="3200" noProof="1">
+              <a:latin typeface="Helvetica Neue" panose="02000503000000020004" pitchFamily="2" charset="0"/>
+              <a:ea typeface="Helvetica Neue" panose="02000503000000020004" pitchFamily="2" charset="0"/>
+              <a:cs typeface="Helvetica Neue" panose="02000503000000020004" pitchFamily="2" charset="0"/>
+            </a:endParaRPr>
+          </a:p>
+          <a:p>
+            <a:pPr algn="just"/>
+            <a:endParaRPr lang="en-GB" sz="3200" noProof="1">
+              <a:latin typeface="Helvetica Neue" panose="02000503000000020004" pitchFamily="2" charset="0"/>
+              <a:ea typeface="Helvetica Neue" panose="02000503000000020004" pitchFamily="2" charset="0"/>
+              <a:cs typeface="Helvetica Neue" panose="02000503000000020004" pitchFamily="2" charset="0"/>
+            </a:endParaRPr>
+          </a:p>
+          <a:p>
+            <a:pPr algn="just"/>
+            <a:endParaRPr lang="en-GB" sz="3200" noProof="1">
+              <a:latin typeface="Helvetica Neue" panose="02000503000000020004" pitchFamily="2" charset="0"/>
+              <a:ea typeface="Helvetica Neue" panose="02000503000000020004" pitchFamily="2" charset="0"/>
+              <a:cs typeface="Helvetica Neue" panose="02000503000000020004" pitchFamily="2" charset="0"/>
+            </a:endParaRPr>
+          </a:p>
+          <a:p>
+            <a:pPr algn="just"/>
+            <a:endParaRPr lang="en-GB" sz="3200" noProof="1">
+              <a:latin typeface="Helvetica Neue" panose="02000503000000020004" pitchFamily="2" charset="0"/>
+              <a:ea typeface="Helvetica Neue" panose="02000503000000020004" pitchFamily="2" charset="0"/>
+              <a:cs typeface="Helvetica Neue" panose="02000503000000020004" pitchFamily="2" charset="0"/>
+            </a:endParaRPr>
+          </a:p>
+          <a:p>
+            <a:pPr algn="just"/>
+            <a:endParaRPr lang="en-GB" sz="3200" noProof="1">
+              <a:latin typeface="Helvetica Neue" panose="02000503000000020004" pitchFamily="2" charset="0"/>
+              <a:ea typeface="Helvetica Neue" panose="02000503000000020004" pitchFamily="2" charset="0"/>
+              <a:cs typeface="Helvetica Neue" panose="02000503000000020004" pitchFamily="2" charset="0"/>
+            </a:endParaRPr>
+          </a:p>
+          <a:p>
+            <a:pPr algn="just"/>
+            <a:endParaRPr lang="en-GB" sz="3200" noProof="1">
+              <a:latin typeface="Helvetica Neue" panose="02000503000000020004" pitchFamily="2" charset="0"/>
+              <a:ea typeface="Helvetica Neue" panose="02000503000000020004" pitchFamily="2" charset="0"/>
+              <a:cs typeface="Helvetica Neue" panose="02000503000000020004" pitchFamily="2" charset="0"/>
+            </a:endParaRPr>
+          </a:p>
+          <a:p>
+            <a:pPr algn="just"/>
+            <a:endParaRPr lang="en-GB" sz="3200" noProof="1">
+              <a:latin typeface="Helvetica Neue" panose="02000503000000020004" pitchFamily="2" charset="0"/>
+              <a:ea typeface="Helvetica Neue" panose="02000503000000020004" pitchFamily="2" charset="0"/>
+              <a:cs typeface="Helvetica Neue" panose="02000503000000020004" pitchFamily="2" charset="0"/>
+            </a:endParaRPr>
+          </a:p>
+          <a:p>
+            <a:pPr algn="just"/>
+            <a:endParaRPr lang="en-GB" sz="3200" noProof="1">
+              <a:latin typeface="Helvetica Neue" panose="02000503000000020004" pitchFamily="2" charset="0"/>
+              <a:ea typeface="Helvetica Neue" panose="02000503000000020004" pitchFamily="2" charset="0"/>
+              <a:cs typeface="Helvetica Neue" panose="02000503000000020004" pitchFamily="2" charset="0"/>
+            </a:endParaRPr>
+          </a:p>
+          <a:p>
+            <a:pPr algn="just"/>
+            <a:endParaRPr lang="en-GB" sz="3200" noProof="1">
+              <a:latin typeface="Helvetica Neue" panose="02000503000000020004" pitchFamily="2" charset="0"/>
+              <a:ea typeface="Helvetica Neue" panose="02000503000000020004" pitchFamily="2" charset="0"/>
+              <a:cs typeface="Helvetica Neue" panose="02000503000000020004" pitchFamily="2" charset="0"/>
+            </a:endParaRPr>
+          </a:p>
+          <a:p>
+            <a:pPr algn="just"/>
+            <a:endParaRPr lang="en-GB" sz="3200" noProof="1">
+              <a:latin typeface="Helvetica Neue" panose="02000503000000020004" pitchFamily="2" charset="0"/>
+              <a:ea typeface="Helvetica Neue" panose="02000503000000020004" pitchFamily="2" charset="0"/>
+              <a:cs typeface="Helvetica Neue" panose="02000503000000020004" pitchFamily="2" charset="0"/>
+            </a:endParaRPr>
+          </a:p>
+          <a:p>
+            <a:pPr algn="just"/>
+            <a:endParaRPr lang="en-GB" sz="3200" noProof="1">
+              <a:latin typeface="Helvetica Neue" panose="02000503000000020004" pitchFamily="2" charset="0"/>
+              <a:ea typeface="Helvetica Neue" panose="02000503000000020004" pitchFamily="2" charset="0"/>
+              <a:cs typeface="Helvetica Neue" panose="02000503000000020004" pitchFamily="2" charset="0"/>
+            </a:endParaRPr>
+          </a:p>
+          <a:p>
+            <a:pPr algn="just"/>
+            <a:endParaRPr lang="en-GB" sz="3200" noProof="1">
+              <a:latin typeface="Helvetica Neue" panose="02000503000000020004" pitchFamily="2" charset="0"/>
+              <a:ea typeface="Helvetica Neue" panose="02000503000000020004" pitchFamily="2" charset="0"/>
+              <a:cs typeface="Helvetica Neue" panose="02000503000000020004" pitchFamily="2" charset="0"/>
+            </a:endParaRPr>
+          </a:p>
+          <a:p>
+            <a:pPr algn="just"/>
+            <a:endParaRPr lang="en-GB" sz="3200" noProof="1">
+              <a:latin typeface="Helvetica Neue" panose="02000503000000020004" pitchFamily="2" charset="0"/>
+              <a:ea typeface="Helvetica Neue" panose="02000503000000020004" pitchFamily="2" charset="0"/>
+              <a:cs typeface="Helvetica Neue" panose="02000503000000020004" pitchFamily="2" charset="0"/>
+            </a:endParaRPr>
+          </a:p>
+          <a:p>
+            <a:pPr algn="just"/>
+            <a:endParaRPr lang="en-GB" sz="3200" noProof="1">
+              <a:latin typeface="Helvetica Neue" panose="02000503000000020004" pitchFamily="2" charset="0"/>
+              <a:ea typeface="Helvetica Neue" panose="02000503000000020004" pitchFamily="2" charset="0"/>
+              <a:cs typeface="Helvetica Neue" panose="02000503000000020004" pitchFamily="2" charset="0"/>
+            </a:endParaRPr>
+          </a:p>
+          <a:p>
+            <a:pPr algn="just"/>
+            <a:endParaRPr lang="en-GB" sz="3200" noProof="1">
+              <a:latin typeface="Helvetica Neue" panose="02000503000000020004" pitchFamily="2" charset="0"/>
+              <a:ea typeface="Helvetica Neue" panose="02000503000000020004" pitchFamily="2" charset="0"/>
+              <a:cs typeface="Helvetica Neue" panose="02000503000000020004" pitchFamily="2" charset="0"/>
+            </a:endParaRPr>
+          </a:p>
+          <a:p>
+            <a:pPr algn="just"/>
+            <a:endParaRPr lang="en-GB" sz="3200" noProof="1">
+              <a:latin typeface="Helvetica Neue" panose="02000503000000020004" pitchFamily="2" charset="0"/>
+              <a:ea typeface="Helvetica Neue" panose="02000503000000020004" pitchFamily="2" charset="0"/>
+              <a:cs typeface="Helvetica Neue" panose="02000503000000020004" pitchFamily="2" charset="0"/>
+            </a:endParaRPr>
+          </a:p>
+          <a:p>
+            <a:pPr algn="just"/>
+            <a:endParaRPr lang="en-GB" sz="3200" noProof="1">
+              <a:latin typeface="Helvetica Neue" panose="02000503000000020004" pitchFamily="2" charset="0"/>
+              <a:ea typeface="Helvetica Neue" panose="02000503000000020004" pitchFamily="2" charset="0"/>
+              <a:cs typeface="Helvetica Neue" panose="02000503000000020004" pitchFamily="2" charset="0"/>
+            </a:endParaRPr>
+          </a:p>
+          <a:p>
+            <a:pPr algn="just"/>
+            <a:r>
+              <a:rPr lang="en-GB" sz="3200" noProof="1">
+                <a:latin typeface="Helvetica Neue" panose="02000503000000020004" pitchFamily="2" charset="0"/>
+                <a:ea typeface="Helvetica Neue" panose="02000503000000020004" pitchFamily="2" charset="0"/>
+                <a:cs typeface="Helvetica Neue" panose="02000503000000020004" pitchFamily="2" charset="0"/>
+              </a:rPr>
+              <a:t>To show the amount of genes that are considered differentially expressed in both comparisons against the control group, a Venn diagram was made (Figure 2). </a:t>
+            </a:r>
+          </a:p>
+          <a:p>
+            <a:pPr algn="just"/>
+            <a:endParaRPr lang="en-GB" sz="3200" noProof="1">
+              <a:latin typeface="Helvetica Neue" panose="02000503000000020004" pitchFamily="2" charset="0"/>
+              <a:ea typeface="Helvetica Neue" panose="02000503000000020004" pitchFamily="2" charset="0"/>
+              <a:cs typeface="Helvetica Neue" panose="02000503000000020004" pitchFamily="2" charset="0"/>
+            </a:endParaRPr>
+          </a:p>
+          <a:p>
+            <a:pPr algn="just"/>
+            <a:endParaRPr lang="en-GB" sz="3200" noProof="1">
+              <a:latin typeface="Helvetica Neue" panose="02000503000000020004" pitchFamily="2" charset="0"/>
+              <a:ea typeface="Helvetica Neue" panose="02000503000000020004" pitchFamily="2" charset="0"/>
+              <a:cs typeface="Helvetica Neue" panose="02000503000000020004" pitchFamily="2" charset="0"/>
+            </a:endParaRPr>
+          </a:p>
+          <a:p>
+            <a:pPr algn="just"/>
+            <a:endParaRPr lang="en-GB" sz="3200" noProof="1">
+              <a:latin typeface="Helvetica Neue" panose="02000503000000020004" pitchFamily="2" charset="0"/>
+              <a:ea typeface="Helvetica Neue" panose="02000503000000020004" pitchFamily="2" charset="0"/>
+              <a:cs typeface="Helvetica Neue" panose="02000503000000020004" pitchFamily="2" charset="0"/>
+            </a:endParaRPr>
+          </a:p>
+          <a:p>
+            <a:pPr algn="just"/>
+            <a:endParaRPr lang="en-GB" sz="3200" noProof="1">
+              <a:latin typeface="Helvetica Neue" panose="02000503000000020004" pitchFamily="2" charset="0"/>
+              <a:ea typeface="Helvetica Neue" panose="02000503000000020004" pitchFamily="2" charset="0"/>
+              <a:cs typeface="Helvetica Neue" panose="02000503000000020004" pitchFamily="2" charset="0"/>
+            </a:endParaRPr>
+          </a:p>
+          <a:p>
+            <a:pPr algn="just"/>
+            <a:endParaRPr lang="en-GB" sz="3200" noProof="1">
+              <a:latin typeface="Helvetica Neue" panose="02000503000000020004" pitchFamily="2" charset="0"/>
+              <a:ea typeface="Helvetica Neue" panose="02000503000000020004" pitchFamily="2" charset="0"/>
+              <a:cs typeface="Helvetica Neue" panose="02000503000000020004" pitchFamily="2" charset="0"/>
+            </a:endParaRPr>
+          </a:p>
+          <a:p>
+            <a:pPr algn="just"/>
+            <a:endParaRPr lang="en-GB" sz="3200" noProof="1">
+              <a:latin typeface="Helvetica Neue" panose="02000503000000020004" pitchFamily="2" charset="0"/>
+              <a:ea typeface="Helvetica Neue" panose="02000503000000020004" pitchFamily="2" charset="0"/>
+              <a:cs typeface="Helvetica Neue" panose="02000503000000020004" pitchFamily="2" charset="0"/>
+            </a:endParaRPr>
+          </a:p>
+          <a:p>
+            <a:pPr algn="just"/>
+            <a:endParaRPr lang="en-GB" sz="3200" noProof="1">
+              <a:latin typeface="Helvetica Neue" panose="02000503000000020004" pitchFamily="2" charset="0"/>
+              <a:ea typeface="Helvetica Neue" panose="02000503000000020004" pitchFamily="2" charset="0"/>
+              <a:cs typeface="Helvetica Neue" panose="02000503000000020004" pitchFamily="2" charset="0"/>
+            </a:endParaRPr>
+          </a:p>
+          <a:p>
+            <a:pPr algn="just"/>
+            <a:endParaRPr lang="en-GB" sz="3200" noProof="1">
+              <a:latin typeface="Helvetica Neue" panose="02000503000000020004" pitchFamily="2" charset="0"/>
+              <a:ea typeface="Helvetica Neue" panose="02000503000000020004" pitchFamily="2" charset="0"/>
+              <a:cs typeface="Helvetica Neue" panose="02000503000000020004" pitchFamily="2" charset="0"/>
+            </a:endParaRPr>
+          </a:p>
+          <a:p>
+            <a:pPr algn="just"/>
+            <a:endParaRPr lang="en-GB" sz="3200" noProof="1">
+              <a:latin typeface="Helvetica Neue" panose="02000503000000020004" pitchFamily="2" charset="0"/>
+              <a:ea typeface="Helvetica Neue" panose="02000503000000020004" pitchFamily="2" charset="0"/>
+              <a:cs typeface="Helvetica Neue" panose="02000503000000020004" pitchFamily="2" charset="0"/>
+            </a:endParaRPr>
+          </a:p>
+          <a:p>
+            <a:pPr algn="just"/>
+            <a:endParaRPr lang="en-GB" sz="3200" noProof="1">
+              <a:latin typeface="Helvetica Neue" panose="02000503000000020004" pitchFamily="2" charset="0"/>
+              <a:ea typeface="Helvetica Neue" panose="02000503000000020004" pitchFamily="2" charset="0"/>
+              <a:cs typeface="Helvetica Neue" panose="02000503000000020004" pitchFamily="2" charset="0"/>
+            </a:endParaRPr>
+          </a:p>
+          <a:p>
+            <a:pPr algn="just"/>
+            <a:endParaRPr lang="en-GB" sz="3200" noProof="1">
+              <a:latin typeface="Helvetica Neue" panose="02000503000000020004" pitchFamily="2" charset="0"/>
+              <a:ea typeface="Helvetica Neue" panose="02000503000000020004" pitchFamily="2" charset="0"/>
+              <a:cs typeface="Helvetica Neue" panose="02000503000000020004" pitchFamily="2" charset="0"/>
+            </a:endParaRPr>
+          </a:p>
+          <a:p>
+            <a:pPr algn="just"/>
+            <a:endParaRPr lang="en-GB" sz="3200" noProof="1">
+              <a:latin typeface="Helvetica Neue" panose="02000503000000020004" pitchFamily="2" charset="0"/>
+              <a:ea typeface="Helvetica Neue" panose="02000503000000020004" pitchFamily="2" charset="0"/>
+              <a:cs typeface="Helvetica Neue" panose="02000503000000020004" pitchFamily="2" charset="0"/>
+            </a:endParaRPr>
+          </a:p>
+          <a:p>
+            <a:pPr algn="just"/>
+            <a:endParaRPr lang="en-GB" sz="3200" noProof="1">
+              <a:latin typeface="Helvetica Neue" panose="02000503000000020004" pitchFamily="2" charset="0"/>
+              <a:ea typeface="Helvetica Neue" panose="02000503000000020004" pitchFamily="2" charset="0"/>
+              <a:cs typeface="Helvetica Neue" panose="02000503000000020004" pitchFamily="2" charset="0"/>
+            </a:endParaRPr>
+          </a:p>
+          <a:p>
+            <a:pPr algn="just"/>
+            <a:endParaRPr lang="en-GB" sz="3200" noProof="1">
+              <a:latin typeface="Helvetica Neue" panose="02000503000000020004" pitchFamily="2" charset="0"/>
+              <a:ea typeface="Helvetica Neue" panose="02000503000000020004" pitchFamily="2" charset="0"/>
+              <a:cs typeface="Helvetica Neue" panose="02000503000000020004" pitchFamily="2" charset="0"/>
+            </a:endParaRPr>
+          </a:p>
+          <a:p>
+            <a:pPr algn="just"/>
+            <a:endParaRPr lang="en-GB" sz="3200" noProof="1">
+              <a:latin typeface="Helvetica Neue" panose="02000503000000020004" pitchFamily="2" charset="0"/>
+              <a:ea typeface="Helvetica Neue" panose="02000503000000020004" pitchFamily="2" charset="0"/>
+              <a:cs typeface="Helvetica Neue" panose="02000503000000020004" pitchFamily="2" charset="0"/>
+            </a:endParaRPr>
+          </a:p>
+          <a:p>
+            <a:pPr algn="just"/>
+            <a:endParaRPr lang="en-GB" sz="3200" noProof="1">
+              <a:latin typeface="Helvetica Neue" panose="02000503000000020004" pitchFamily="2" charset="0"/>
+              <a:ea typeface="Helvetica Neue" panose="02000503000000020004" pitchFamily="2" charset="0"/>
+              <a:cs typeface="Helvetica Neue" panose="02000503000000020004" pitchFamily="2" charset="0"/>
+            </a:endParaRPr>
+          </a:p>
+          <a:p>
+            <a:pPr algn="just"/>
+            <a:r>
+              <a:rPr lang="en-GB" sz="3200" noProof="1">
+                <a:latin typeface="Helvetica Neue" panose="02000503000000020004" pitchFamily="2" charset="0"/>
+                <a:ea typeface="Helvetica Neue" panose="02000503000000020004" pitchFamily="2" charset="0"/>
+                <a:cs typeface="Helvetica Neue" panose="02000503000000020004" pitchFamily="2" charset="0"/>
+              </a:rPr>
+              <a:t>In the end a total of 119 DEGs were found, of which 36 are shared between the comparisons and thus these are the most important.</a:t>
             </a:r>
           </a:p>
         </p:txBody>
@@ -3861,8 +4771,8 @@
         </p:nvSpPr>
         <p:spPr>
           <a:xfrm>
-            <a:off x="12761998" y="21347882"/>
-            <a:ext cx="16361213" cy="15915482"/>
+            <a:off x="12761998" y="29480256"/>
+            <a:ext cx="16361213" cy="7783108"/>
           </a:xfrm>
           <a:prstGeom prst="rect">
             <a:avLst/>
@@ -3875,6 +4785,7 @@
           </a:bodyPr>
           <a:lstStyle/>
           <a:p>
+            <a:pPr algn="just"/>
             <a:r>
               <a:rPr lang="en-GB" sz="5400" noProof="1">
                 <a:solidFill>
@@ -3884,7 +4795,7 @@
                 <a:ea typeface="Helvetica Neue" panose="02000503000000020004" pitchFamily="2" charset="0"/>
                 <a:cs typeface="Helvetica Neue" panose="02000503000000020004" pitchFamily="2" charset="0"/>
               </a:rPr>
-              <a:t>Conclusion and Discussion</a:t>
+              <a:t>Conclusion / Discussion</a:t>
             </a:r>
             <a:endParaRPr lang="en-GB" sz="3200" noProof="1">
               <a:solidFill>
@@ -3896,6 +4807,7 @@
             </a:endParaRPr>
           </a:p>
           <a:p>
+            <a:pPr algn="just"/>
             <a:endParaRPr lang="en-GB" sz="2400" noProof="1">
               <a:latin typeface="Helvetica Neue" panose="02000503000000020004" pitchFamily="2" charset="0"/>
               <a:ea typeface="Helvetica Neue" panose="02000503000000020004" pitchFamily="2" charset="0"/>
@@ -3903,24 +4815,210 @@
             </a:endParaRPr>
           </a:p>
           <a:p>
+            <a:pPr algn="just"/>
             <a:r>
               <a:rPr lang="en-GB" sz="3200" noProof="1">
                 <a:latin typeface="Helvetica Neue" panose="02000503000000020004" pitchFamily="2" charset="0"/>
                 <a:ea typeface="Helvetica Neue" panose="02000503000000020004" pitchFamily="2" charset="0"/>
                 <a:cs typeface="Helvetica Neue" panose="02000503000000020004" pitchFamily="2" charset="0"/>
               </a:rPr>
-              <a:t>Text text text text text text text text text text text text text text text text text text text text text text text text text text text text text text text text text text text text text text text text text text text text text text text text text text text text text text text text text text text text text text text text text text text text text text text text text text text text text text text text text text text text text text text text text text text text text text text text text text text text text text text text text text text text text text text text text text text text text text text text text text text text text text text text text text text text text text text text text text text text text text text text text text text text text text text text text text text text text text text text text text text text text text text text text text text text text text text text text text text text text text text text text text text text text text text text text text text text text text text text text text text text text text text text text text text text text text text text text text text text text text text text text text text text text text text text text text text text text text </a:t>
-            </a:r>
-          </a:p>
-          <a:p>
+              <a:t>The majority of DEGs that were found are up-regulated, this was sort of surprising since it's hearing loss, and you'd think that there is mainly down-regulation because of a loss of function. This could possibly be explaining there are a lot of genes that were expressed more to try and fix damage caused by the noise insults.</a:t>
+            </a:r>
+          </a:p>
+          <a:p>
+            <a:pPr algn="just"/>
             <a:endParaRPr lang="en-GB" sz="3200" noProof="1">
               <a:latin typeface="Helvetica Neue" panose="02000503000000020004" pitchFamily="2" charset="0"/>
               <a:ea typeface="Helvetica Neue" panose="02000503000000020004" pitchFamily="2" charset="0"/>
               <a:cs typeface="Helvetica Neue" panose="02000503000000020004" pitchFamily="2" charset="0"/>
             </a:endParaRPr>
           </a:p>
-        </p:txBody>
-      </p:sp>
+          <a:p>
+            <a:pPr algn="just"/>
+            <a:r>
+              <a:rPr lang="en-GB" sz="3200" noProof="1">
+                <a:latin typeface="Helvetica Neue" panose="02000503000000020004" pitchFamily="2" charset="0"/>
+                <a:ea typeface="Helvetica Neue" panose="02000503000000020004" pitchFamily="2" charset="0"/>
+                <a:cs typeface="Helvetica Neue" panose="02000503000000020004" pitchFamily="2" charset="0"/>
+              </a:rPr>
+              <a:t>When performing Multi-Dimensional scaling replicates clustered nicely but the very loud group was found to be more similar to the ambient group. This is also in line with that there were more DEGs found in the loud group (87) than in the very loud group (68).</a:t>
+            </a:r>
+          </a:p>
+          <a:p>
+            <a:pPr algn="just"/>
+            <a:endParaRPr lang="en-GB" sz="3200" noProof="1">
+              <a:latin typeface="Helvetica Neue" panose="02000503000000020004" pitchFamily="2" charset="0"/>
+              <a:ea typeface="Helvetica Neue" panose="02000503000000020004" pitchFamily="2" charset="0"/>
+              <a:cs typeface="Helvetica Neue" panose="02000503000000020004" pitchFamily="2" charset="0"/>
+            </a:endParaRPr>
+          </a:p>
+          <a:p>
+            <a:pPr algn="just"/>
+            <a:r>
+              <a:rPr lang="en-GB" sz="3200" noProof="1">
+                <a:latin typeface="Helvetica Neue" panose="02000503000000020004" pitchFamily="2" charset="0"/>
+                <a:ea typeface="Helvetica Neue" panose="02000503000000020004" pitchFamily="2" charset="0"/>
+                <a:cs typeface="Helvetica Neue" panose="02000503000000020004" pitchFamily="2" charset="0"/>
+              </a:rPr>
+              <a:t>Something extra that could have been done is to perform the analysis using different normalization methods or packages, this could lead to different results or strengthen the already achieved results. The next step for after this experiment would be to look at the discovered DEGs in more detail and find out what they do exactly.</a:t>
+            </a:r>
+          </a:p>
+        </p:txBody>
+      </p:sp>
+      <p:pic>
+        <p:nvPicPr>
+          <p:cNvPr id="9" name="Picture 8">
+            <a:extLst>
+              <a:ext uri="{FF2B5EF4-FFF2-40B4-BE49-F238E27FC236}">
+                <a16:creationId xmlns:a16="http://schemas.microsoft.com/office/drawing/2014/main" id="{C401E852-B681-AA82-8C7C-77F4E598D6CF}"/>
+              </a:ext>
+            </a:extLst>
+          </p:cNvPr>
+          <p:cNvPicPr>
+            <a:picLocks noChangeAspect="1"/>
+          </p:cNvPicPr>
+          <p:nvPr/>
+        </p:nvPicPr>
+        <p:blipFill>
+          <a:blip r:embed="rId6"/>
+          <a:stretch>
+            <a:fillRect/>
+          </a:stretch>
+        </p:blipFill>
+        <p:spPr>
+          <a:xfrm>
+            <a:off x="15137606" y="8923906"/>
+            <a:ext cx="11712767" cy="7228450"/>
+          </a:xfrm>
+          <a:prstGeom prst="rect">
+            <a:avLst/>
+          </a:prstGeom>
+        </p:spPr>
+      </p:pic>
+      <p:sp>
+        <p:nvSpPr>
+          <p:cNvPr id="23" name="TextBox 22">
+            <a:extLst>
+              <a:ext uri="{FF2B5EF4-FFF2-40B4-BE49-F238E27FC236}">
+                <a16:creationId xmlns:a16="http://schemas.microsoft.com/office/drawing/2014/main" id="{F440FA86-47DB-06AB-F67F-1B6C0B8D8B19}"/>
+              </a:ext>
+            </a:extLst>
+          </p:cNvPr>
+          <p:cNvSpPr txBox="1"/>
+          <p:nvPr/>
+        </p:nvSpPr>
+        <p:spPr>
+          <a:xfrm>
+            <a:off x="15137606" y="16286716"/>
+            <a:ext cx="11654314" cy="1569660"/>
+          </a:xfrm>
+          <a:prstGeom prst="rect">
+            <a:avLst/>
+          </a:prstGeom>
+          <a:noFill/>
+        </p:spPr>
+        <p:txBody>
+          <a:bodyPr wrap="square" rtlCol="0">
+            <a:spAutoFit/>
+          </a:bodyPr>
+          <a:lstStyle/>
+          <a:p>
+            <a:pPr algn="just"/>
+            <a:r>
+              <a:rPr lang="en-NL" sz="2400" b="1" dirty="0"/>
+              <a:t>Figure 1: Volcano Plot plotting all genes with their -log</a:t>
+            </a:r>
+            <a:r>
+              <a:rPr lang="en-NL" sz="2400" b="1" baseline="-25000" dirty="0"/>
+              <a:t>10</a:t>
+            </a:r>
+            <a:r>
+              <a:rPr lang="en-NL" sz="2400" b="1" dirty="0"/>
+              <a:t> p-value against log</a:t>
+            </a:r>
+            <a:r>
+              <a:rPr lang="en-NL" sz="2400" b="1" baseline="-25000" dirty="0"/>
+              <a:t>2</a:t>
+            </a:r>
+            <a:r>
+              <a:rPr lang="en-NL" sz="2400" b="1" dirty="0"/>
+              <a:t> fold change. </a:t>
+            </a:r>
+          </a:p>
+          <a:p>
+            <a:pPr algn="just"/>
+            <a:r>
+              <a:rPr lang="en-NL" sz="2400" i="1" dirty="0"/>
+              <a:t>Blue dots are statistically significant but don’t have a high enough fold change. Gray dots have neither significance nor a high enough fold change. Red dots have both significance and a high enough fold change and are thus considered DEGs.</a:t>
+            </a:r>
+          </a:p>
+        </p:txBody>
+      </p:sp>
+      <p:sp>
+        <p:nvSpPr>
+          <p:cNvPr id="31" name="TextBox 30">
+            <a:extLst>
+              <a:ext uri="{FF2B5EF4-FFF2-40B4-BE49-F238E27FC236}">
+                <a16:creationId xmlns:a16="http://schemas.microsoft.com/office/drawing/2014/main" id="{5477BF27-057E-F3E2-38CD-3029C4A00289}"/>
+              </a:ext>
+            </a:extLst>
+          </p:cNvPr>
+          <p:cNvSpPr txBox="1"/>
+          <p:nvPr/>
+        </p:nvSpPr>
+        <p:spPr>
+          <a:xfrm>
+            <a:off x="14913293" y="26138385"/>
+            <a:ext cx="11937080" cy="461665"/>
+          </a:xfrm>
+          <a:prstGeom prst="rect">
+            <a:avLst/>
+          </a:prstGeom>
+          <a:noFill/>
+        </p:spPr>
+        <p:txBody>
+          <a:bodyPr wrap="square" rtlCol="0">
+            <a:spAutoFit/>
+          </a:bodyPr>
+          <a:lstStyle/>
+          <a:p>
+            <a:r>
+              <a:rPr lang="en-NL" sz="2400" b="1" dirty="0"/>
+              <a:t>Figure 2: Venn Diagram showing the amount of shared DEGs between group comparisons. </a:t>
+            </a:r>
+          </a:p>
+        </p:txBody>
+      </p:sp>
+      <p:pic>
+        <p:nvPicPr>
+          <p:cNvPr id="28" name="Picture 27">
+            <a:extLst>
+              <a:ext uri="{FF2B5EF4-FFF2-40B4-BE49-F238E27FC236}">
+                <a16:creationId xmlns:a16="http://schemas.microsoft.com/office/drawing/2014/main" id="{1A7304ED-9D8D-577A-DB17-32DC4BC351A7}"/>
+              </a:ext>
+            </a:extLst>
+          </p:cNvPr>
+          <p:cNvPicPr>
+            <a:picLocks noChangeAspect="1"/>
+          </p:cNvPicPr>
+          <p:nvPr/>
+        </p:nvPicPr>
+        <p:blipFill>
+          <a:blip r:embed="rId7"/>
+          <a:stretch>
+            <a:fillRect/>
+          </a:stretch>
+        </p:blipFill>
+        <p:spPr>
+          <a:xfrm>
+            <a:off x="15025450" y="19681347"/>
+            <a:ext cx="11712767" cy="6457038"/>
+          </a:xfrm>
+          <a:prstGeom prst="rect">
+            <a:avLst/>
+          </a:prstGeom>
+        </p:spPr>
+      </p:pic>
     </p:spTree>
     <p:extLst>
       <p:ext uri="{BB962C8B-B14F-4D97-AF65-F5344CB8AC3E}">
@@ -4193,4 +5291,299 @@
     </a:ext>
   </a:extLst>
 </a:theme>
+</file>
+
+<file path=ppt/theme/theme2.xml><?xml version="1.0" encoding="utf-8"?>
+<a:theme xmlns:a="http://schemas.openxmlformats.org/drawingml/2006/main" name="Office Theme">
+  <a:themeElements>
+    <a:clrScheme name="Office">
+      <a:dk1>
+        <a:sysClr val="windowText" lastClr="000000"/>
+      </a:dk1>
+      <a:lt1>
+        <a:sysClr val="window" lastClr="FFFFFF"/>
+      </a:lt1>
+      <a:dk2>
+        <a:srgbClr val="44546A"/>
+      </a:dk2>
+      <a:lt2>
+        <a:srgbClr val="E7E6E6"/>
+      </a:lt2>
+      <a:accent1>
+        <a:srgbClr val="4472C4"/>
+      </a:accent1>
+      <a:accent2>
+        <a:srgbClr val="ED7D31"/>
+      </a:accent2>
+      <a:accent3>
+        <a:srgbClr val="A5A5A5"/>
+      </a:accent3>
+      <a:accent4>
+        <a:srgbClr val="FFC000"/>
+      </a:accent4>
+      <a:accent5>
+        <a:srgbClr val="5B9BD5"/>
+      </a:accent5>
+      <a:accent6>
+        <a:srgbClr val="70AD47"/>
+      </a:accent6>
+      <a:hlink>
+        <a:srgbClr val="0563C1"/>
+      </a:hlink>
+      <a:folHlink>
+        <a:srgbClr val="954F72"/>
+      </a:folHlink>
+    </a:clrScheme>
+    <a:fontScheme name="Office">
+      <a:majorFont>
+        <a:latin typeface="Calibri Light" panose="020F0302020204030204"/>
+        <a:ea typeface=""/>
+        <a:cs typeface=""/>
+        <a:font script="Jpan" typeface="游ゴシック Light"/>
+        <a:font script="Hang" typeface="맑은 고딕"/>
+        <a:font script="Hans" typeface="等线 Light"/>
+        <a:font script="Hant" typeface="新細明體"/>
+        <a:font script="Arab" typeface="Times New Roman"/>
+        <a:font script="Hebr" typeface="Times New Roman"/>
+        <a:font script="Thai" typeface="Angsana New"/>
+        <a:font script="Ethi" typeface="Nyala"/>
+        <a:font script="Beng" typeface="Vrinda"/>
+        <a:font script="Gujr" typeface="Shruti"/>
+        <a:font script="Khmr" typeface="MoolBoran"/>
+        <a:font script="Knda" typeface="Tunga"/>
+        <a:font script="Guru" typeface="Raavi"/>
+        <a:font script="Cans" typeface="Euphemia"/>
+        <a:font script="Cher" typeface="Plantagenet Cherokee"/>
+        <a:font script="Yiii" typeface="Microsoft Yi Baiti"/>
+        <a:font script="Tibt" typeface="Microsoft Himalaya"/>
+        <a:font script="Thaa" typeface="MV Boli"/>
+        <a:font script="Deva" typeface="Mangal"/>
+        <a:font script="Telu" typeface="Gautami"/>
+        <a:font script="Taml" typeface="Latha"/>
+        <a:font script="Syrc" typeface="Estrangelo Edessa"/>
+        <a:font script="Orya" typeface="Kalinga"/>
+        <a:font script="Mlym" typeface="Kartika"/>
+        <a:font script="Laoo" typeface="DokChampa"/>
+        <a:font script="Sinh" typeface="Iskoola Pota"/>
+        <a:font script="Mong" typeface="Mongolian Baiti"/>
+        <a:font script="Viet" typeface="Times New Roman"/>
+        <a:font script="Uigh" typeface="Microsoft Uighur"/>
+        <a:font script="Geor" typeface="Sylfaen"/>
+        <a:font script="Armn" typeface="Arial"/>
+        <a:font script="Bugi" typeface="Leelawadee UI"/>
+        <a:font script="Bopo" typeface="Microsoft JhengHei"/>
+        <a:font script="Java" typeface="Javanese Text"/>
+        <a:font script="Lisu" typeface="Segoe UI"/>
+        <a:font script="Mymr" typeface="Myanmar Text"/>
+        <a:font script="Nkoo" typeface="Ebrima"/>
+        <a:font script="Olck" typeface="Nirmala UI"/>
+        <a:font script="Osma" typeface="Ebrima"/>
+        <a:font script="Phag" typeface="Phagspa"/>
+        <a:font script="Syrn" typeface="Estrangelo Edessa"/>
+        <a:font script="Syrj" typeface="Estrangelo Edessa"/>
+        <a:font script="Syre" typeface="Estrangelo Edessa"/>
+        <a:font script="Sora" typeface="Nirmala UI"/>
+        <a:font script="Tale" typeface="Microsoft Tai Le"/>
+        <a:font script="Talu" typeface="Microsoft New Tai Lue"/>
+        <a:font script="Tfng" typeface="Ebrima"/>
+      </a:majorFont>
+      <a:minorFont>
+        <a:latin typeface="Calibri" panose="020F0502020204030204"/>
+        <a:ea typeface=""/>
+        <a:cs typeface=""/>
+        <a:font script="Jpan" typeface="游ゴシック"/>
+        <a:font script="Hang" typeface="맑은 고딕"/>
+        <a:font script="Hans" typeface="等线"/>
+        <a:font script="Hant" typeface="新細明體"/>
+        <a:font script="Arab" typeface="Arial"/>
+        <a:font script="Hebr" typeface="Arial"/>
+        <a:font script="Thai" typeface="Cordia New"/>
+        <a:font script="Ethi" typeface="Nyala"/>
+        <a:font script="Beng" typeface="Vrinda"/>
+        <a:font script="Gujr" typeface="Shruti"/>
+        <a:font script="Khmr" typeface="DaunPenh"/>
+        <a:font script="Knda" typeface="Tunga"/>
+        <a:font script="Guru" typeface="Raavi"/>
+        <a:font script="Cans" typeface="Euphemia"/>
+        <a:font script="Cher" typeface="Plantagenet Cherokee"/>
+        <a:font script="Yiii" typeface="Microsoft Yi Baiti"/>
+        <a:font script="Tibt" typeface="Microsoft Himalaya"/>
+        <a:font script="Thaa" typeface="MV Boli"/>
+        <a:font script="Deva" typeface="Mangal"/>
+        <a:font script="Telu" typeface="Gautami"/>
+        <a:font script="Taml" typeface="Latha"/>
+        <a:font script="Syrc" typeface="Estrangelo Edessa"/>
+        <a:font script="Orya" typeface="Kalinga"/>
+        <a:font script="Mlym" typeface="Kartika"/>
+        <a:font script="Laoo" typeface="DokChampa"/>
+        <a:font script="Sinh" typeface="Iskoola Pota"/>
+        <a:font script="Mong" typeface="Mongolian Baiti"/>
+        <a:font script="Viet" typeface="Arial"/>
+        <a:font script="Uigh" typeface="Microsoft Uighur"/>
+        <a:font script="Geor" typeface="Sylfaen"/>
+        <a:font script="Armn" typeface="Arial"/>
+        <a:font script="Bugi" typeface="Leelawadee UI"/>
+        <a:font script="Bopo" typeface="Microsoft JhengHei"/>
+        <a:font script="Java" typeface="Javanese Text"/>
+        <a:font script="Lisu" typeface="Segoe UI"/>
+        <a:font script="Mymr" typeface="Myanmar Text"/>
+        <a:font script="Nkoo" typeface="Ebrima"/>
+        <a:font script="Olck" typeface="Nirmala UI"/>
+        <a:font script="Osma" typeface="Ebrima"/>
+        <a:font script="Phag" typeface="Phagspa"/>
+        <a:font script="Syrn" typeface="Estrangelo Edessa"/>
+        <a:font script="Syrj" typeface="Estrangelo Edessa"/>
+        <a:font script="Syre" typeface="Estrangelo Edessa"/>
+        <a:font script="Sora" typeface="Nirmala UI"/>
+        <a:font script="Tale" typeface="Microsoft Tai Le"/>
+        <a:font script="Talu" typeface="Microsoft New Tai Lue"/>
+        <a:font script="Tfng" typeface="Ebrima"/>
+      </a:minorFont>
+    </a:fontScheme>
+    <a:fmtScheme name="Office">
+      <a:fillStyleLst>
+        <a:solidFill>
+          <a:schemeClr val="phClr"/>
+        </a:solidFill>
+        <a:gradFill rotWithShape="1">
+          <a:gsLst>
+            <a:gs pos="0">
+              <a:schemeClr val="phClr">
+                <a:lumMod val="110000"/>
+                <a:satMod val="105000"/>
+                <a:tint val="67000"/>
+              </a:schemeClr>
+            </a:gs>
+            <a:gs pos="50000">
+              <a:schemeClr val="phClr">
+                <a:lumMod val="105000"/>
+                <a:satMod val="103000"/>
+                <a:tint val="73000"/>
+              </a:schemeClr>
+            </a:gs>
+            <a:gs pos="100000">
+              <a:schemeClr val="phClr">
+                <a:lumMod val="105000"/>
+                <a:satMod val="109000"/>
+                <a:tint val="81000"/>
+              </a:schemeClr>
+            </a:gs>
+          </a:gsLst>
+          <a:lin ang="5400000" scaled="0"/>
+        </a:gradFill>
+        <a:gradFill rotWithShape="1">
+          <a:gsLst>
+            <a:gs pos="0">
+              <a:schemeClr val="phClr">
+                <a:satMod val="103000"/>
+                <a:lumMod val="102000"/>
+                <a:tint val="94000"/>
+              </a:schemeClr>
+            </a:gs>
+            <a:gs pos="50000">
+              <a:schemeClr val="phClr">
+                <a:satMod val="110000"/>
+                <a:lumMod val="100000"/>
+                <a:shade val="100000"/>
+              </a:schemeClr>
+            </a:gs>
+            <a:gs pos="100000">
+              <a:schemeClr val="phClr">
+                <a:lumMod val="99000"/>
+                <a:satMod val="120000"/>
+                <a:shade val="78000"/>
+              </a:schemeClr>
+            </a:gs>
+          </a:gsLst>
+          <a:lin ang="5400000" scaled="0"/>
+        </a:gradFill>
+      </a:fillStyleLst>
+      <a:lnStyleLst>
+        <a:ln w="6350" cap="flat" cmpd="sng" algn="ctr">
+          <a:solidFill>
+            <a:schemeClr val="phClr"/>
+          </a:solidFill>
+          <a:prstDash val="solid"/>
+          <a:miter lim="800000"/>
+        </a:ln>
+        <a:ln w="12700" cap="flat" cmpd="sng" algn="ctr">
+          <a:solidFill>
+            <a:schemeClr val="phClr"/>
+          </a:solidFill>
+          <a:prstDash val="solid"/>
+          <a:miter lim="800000"/>
+        </a:ln>
+        <a:ln w="19050" cap="flat" cmpd="sng" algn="ctr">
+          <a:solidFill>
+            <a:schemeClr val="phClr"/>
+          </a:solidFill>
+          <a:prstDash val="solid"/>
+          <a:miter lim="800000"/>
+        </a:ln>
+      </a:lnStyleLst>
+      <a:effectStyleLst>
+        <a:effectStyle>
+          <a:effectLst/>
+        </a:effectStyle>
+        <a:effectStyle>
+          <a:effectLst/>
+        </a:effectStyle>
+        <a:effectStyle>
+          <a:effectLst>
+            <a:outerShdw blurRad="57150" dist="19050" dir="5400000" algn="ctr" rotWithShape="0">
+              <a:srgbClr val="000000">
+                <a:alpha val="63000"/>
+              </a:srgbClr>
+            </a:outerShdw>
+          </a:effectLst>
+        </a:effectStyle>
+      </a:effectStyleLst>
+      <a:bgFillStyleLst>
+        <a:solidFill>
+          <a:schemeClr val="phClr"/>
+        </a:solidFill>
+        <a:solidFill>
+          <a:schemeClr val="phClr">
+            <a:tint val="95000"/>
+            <a:satMod val="170000"/>
+          </a:schemeClr>
+        </a:solidFill>
+        <a:gradFill rotWithShape="1">
+          <a:gsLst>
+            <a:gs pos="0">
+              <a:schemeClr val="phClr">
+                <a:tint val="93000"/>
+                <a:satMod val="150000"/>
+                <a:shade val="98000"/>
+                <a:lumMod val="102000"/>
+              </a:schemeClr>
+            </a:gs>
+            <a:gs pos="50000">
+              <a:schemeClr val="phClr">
+                <a:tint val="98000"/>
+                <a:satMod val="130000"/>
+                <a:shade val="90000"/>
+                <a:lumMod val="103000"/>
+              </a:schemeClr>
+            </a:gs>
+            <a:gs pos="100000">
+              <a:schemeClr val="phClr">
+                <a:shade val="63000"/>
+                <a:satMod val="120000"/>
+              </a:schemeClr>
+            </a:gs>
+          </a:gsLst>
+          <a:lin ang="5400000" scaled="0"/>
+        </a:gradFill>
+      </a:bgFillStyleLst>
+    </a:fmtScheme>
+  </a:themeElements>
+  <a:objectDefaults/>
+  <a:extraClrSchemeLst/>
+  <a:extLst>
+    <a:ext uri="{05A4C25C-085E-4340-85A3-A5531E510DB2}">
+      <thm15:themeFamily xmlns:thm15="http://schemas.microsoft.com/office/thememl/2012/main" name="Office Theme" id="{62F939B6-93AF-4DB8-9C6B-D6C7DFDC589F}" vid="{4A3C46E8-61CC-4603-A589-7422A47A8E4A}"/>
+    </a:ext>
+  </a:extLst>
+</a:theme>
 </file>
</xml_diff>

<commit_message>
Fixed very minor mistake in the poster footer
The institute name was not spelled correctly and fully.
</commit_message>
<xml_diff>
--- a/poster/poster.pptx
+++ b/poster/poster.pptx
@@ -128,12 +128,12 @@
   <pc:docChgLst>
     <pc:chgData name="Talen VK, Vincent" userId="7a591fd1-38bf-40a7-8dc5-c7b4c67e7540" providerId="ADAL" clId="{57DA0EA2-C5F5-444B-9841-035F8C68153E}"/>
     <pc:docChg chg="undo redo custSel modSld">
-      <pc:chgData name="Talen VK, Vincent" userId="7a591fd1-38bf-40a7-8dc5-c7b4c67e7540" providerId="ADAL" clId="{57DA0EA2-C5F5-444B-9841-035F8C68153E}" dt="2022-04-17T21:10:39.678" v="2515" actId="20577"/>
+      <pc:chgData name="Talen VK, Vincent" userId="7a591fd1-38bf-40a7-8dc5-c7b4c67e7540" providerId="ADAL" clId="{57DA0EA2-C5F5-444B-9841-035F8C68153E}" dt="2022-06-01T13:12:05.901" v="2585" actId="1037"/>
       <pc:docMkLst>
         <pc:docMk/>
       </pc:docMkLst>
       <pc:sldChg chg="addSp delSp modSp mod">
-        <pc:chgData name="Talen VK, Vincent" userId="7a591fd1-38bf-40a7-8dc5-c7b4c67e7540" providerId="ADAL" clId="{57DA0EA2-C5F5-444B-9841-035F8C68153E}" dt="2022-04-17T21:10:39.678" v="2515" actId="20577"/>
+        <pc:chgData name="Talen VK, Vincent" userId="7a591fd1-38bf-40a7-8dc5-c7b4c67e7540" providerId="ADAL" clId="{57DA0EA2-C5F5-444B-9841-035F8C68153E}" dt="2022-06-01T13:12:05.901" v="2585" actId="1037"/>
         <pc:sldMkLst>
           <pc:docMk/>
           <pc:sldMk cId="870601871" sldId="256"/>
@@ -160,6 +160,14 @@
             <pc:docMk/>
             <pc:sldMk cId="870601871" sldId="256"/>
             <ac:spMk id="12" creationId="{96397A83-FA71-0941-BCA8-9C7FA4733AAF}"/>
+          </ac:spMkLst>
+        </pc:spChg>
+        <pc:spChg chg="mod">
+          <ac:chgData name="Talen VK, Vincent" userId="7a591fd1-38bf-40a7-8dc5-c7b4c67e7540" providerId="ADAL" clId="{57DA0EA2-C5F5-444B-9841-035F8C68153E}" dt="2022-06-01T13:12:05.901" v="2585" actId="1037"/>
+          <ac:spMkLst>
+            <pc:docMk/>
+            <pc:sldMk cId="870601871" sldId="256"/>
+            <ac:spMk id="15" creationId="{CDDB9B80-BFE3-FB43-870D-6E440C81DADA}"/>
           </ac:spMkLst>
         </pc:spChg>
         <pc:spChg chg="add mod">
@@ -282,6 +290,14 @@
             <ac:picMk id="33" creationId="{4714B3F4-8700-CD30-C904-D51C6FDD41F0}"/>
           </ac:picMkLst>
         </pc:picChg>
+        <pc:cxnChg chg="mod">
+          <ac:chgData name="Talen VK, Vincent" userId="7a591fd1-38bf-40a7-8dc5-c7b4c67e7540" providerId="ADAL" clId="{57DA0EA2-C5F5-444B-9841-035F8C68153E}" dt="2022-06-01T13:12:05.901" v="2585" actId="1037"/>
+          <ac:cxnSpMkLst>
+            <pc:docMk/>
+            <pc:sldMk cId="870601871" sldId="256"/>
+            <ac:cxnSpMk id="17" creationId="{AD4403BF-FEB5-5443-A597-C1BF5D624997}"/>
+          </ac:cxnSpMkLst>
+        </pc:cxnChg>
       </pc:sldChg>
     </pc:docChg>
   </pc:docChgLst>
@@ -370,7 +386,7 @@
           <a:p>
             <a:fld id="{D17B2D2D-AA5E-E74E-B007-4BE5E79DB111}" type="datetimeFigureOut">
               <a:rPr lang="en-NL" smtClean="0"/>
-              <a:t>17/04/2022</a:t>
+              <a:t>01/06/2022</a:t>
             </a:fld>
             <a:endParaRPr lang="en-NL"/>
           </a:p>
@@ -853,7 +869,7 @@
           <a:p>
             <a:fld id="{3F1A2556-9B38-DC43-8BF2-565CEB700637}" type="datetimeFigureOut">
               <a:rPr lang="en-NL" smtClean="0"/>
-              <a:t>17/04/2022</a:t>
+              <a:t>01/06/2022</a:t>
             </a:fld>
             <a:endParaRPr lang="en-NL"/>
           </a:p>
@@ -1023,7 +1039,7 @@
           <a:p>
             <a:fld id="{3F1A2556-9B38-DC43-8BF2-565CEB700637}" type="datetimeFigureOut">
               <a:rPr lang="en-NL" smtClean="0"/>
-              <a:t>17/04/2022</a:t>
+              <a:t>01/06/2022</a:t>
             </a:fld>
             <a:endParaRPr lang="en-NL"/>
           </a:p>
@@ -1203,7 +1219,7 @@
           <a:p>
             <a:fld id="{3F1A2556-9B38-DC43-8BF2-565CEB700637}" type="datetimeFigureOut">
               <a:rPr lang="en-NL" smtClean="0"/>
-              <a:t>17/04/2022</a:t>
+              <a:t>01/06/2022</a:t>
             </a:fld>
             <a:endParaRPr lang="en-NL"/>
           </a:p>
@@ -1373,7 +1389,7 @@
           <a:p>
             <a:fld id="{3F1A2556-9B38-DC43-8BF2-565CEB700637}" type="datetimeFigureOut">
               <a:rPr lang="en-NL" smtClean="0"/>
-              <a:t>17/04/2022</a:t>
+              <a:t>01/06/2022</a:t>
             </a:fld>
             <a:endParaRPr lang="en-NL"/>
           </a:p>
@@ -1617,7 +1633,7 @@
           <a:p>
             <a:fld id="{3F1A2556-9B38-DC43-8BF2-565CEB700637}" type="datetimeFigureOut">
               <a:rPr lang="en-NL" smtClean="0"/>
-              <a:t>17/04/2022</a:t>
+              <a:t>01/06/2022</a:t>
             </a:fld>
             <a:endParaRPr lang="en-NL"/>
           </a:p>
@@ -1849,7 +1865,7 @@
           <a:p>
             <a:fld id="{3F1A2556-9B38-DC43-8BF2-565CEB700637}" type="datetimeFigureOut">
               <a:rPr lang="en-NL" smtClean="0"/>
-              <a:t>17/04/2022</a:t>
+              <a:t>01/06/2022</a:t>
             </a:fld>
             <a:endParaRPr lang="en-NL"/>
           </a:p>
@@ -2216,7 +2232,7 @@
           <a:p>
             <a:fld id="{3F1A2556-9B38-DC43-8BF2-565CEB700637}" type="datetimeFigureOut">
               <a:rPr lang="en-NL" smtClean="0"/>
-              <a:t>17/04/2022</a:t>
+              <a:t>01/06/2022</a:t>
             </a:fld>
             <a:endParaRPr lang="en-NL"/>
           </a:p>
@@ -2334,7 +2350,7 @@
           <a:p>
             <a:fld id="{3F1A2556-9B38-DC43-8BF2-565CEB700637}" type="datetimeFigureOut">
               <a:rPr lang="en-NL" smtClean="0"/>
-              <a:t>17/04/2022</a:t>
+              <a:t>01/06/2022</a:t>
             </a:fld>
             <a:endParaRPr lang="en-NL"/>
           </a:p>
@@ -2429,7 +2445,7 @@
           <a:p>
             <a:fld id="{3F1A2556-9B38-DC43-8BF2-565CEB700637}" type="datetimeFigureOut">
               <a:rPr lang="en-NL" smtClean="0"/>
-              <a:t>17/04/2022</a:t>
+              <a:t>01/06/2022</a:t>
             </a:fld>
             <a:endParaRPr lang="en-NL"/>
           </a:p>
@@ -2706,7 +2722,7 @@
           <a:p>
             <a:fld id="{3F1A2556-9B38-DC43-8BF2-565CEB700637}" type="datetimeFigureOut">
               <a:rPr lang="en-NL" smtClean="0"/>
-              <a:t>17/04/2022</a:t>
+              <a:t>01/06/2022</a:t>
             </a:fld>
             <a:endParaRPr lang="en-NL"/>
           </a:p>
@@ -2963,7 +2979,7 @@
           <a:p>
             <a:fld id="{3F1A2556-9B38-DC43-8BF2-565CEB700637}" type="datetimeFigureOut">
               <a:rPr lang="en-NL" smtClean="0"/>
-              <a:t>17/04/2022</a:t>
+              <a:t>01/06/2022</a:t>
             </a:fld>
             <a:endParaRPr lang="en-NL"/>
           </a:p>
@@ -3176,7 +3192,7 @@
           <a:p>
             <a:fld id="{3F1A2556-9B38-DC43-8BF2-565CEB700637}" type="datetimeFigureOut">
               <a:rPr lang="en-NL" smtClean="0"/>
-              <a:t>17/04/2022</a:t>
+              <a:t>01/06/2022</a:t>
             </a:fld>
             <a:endParaRPr lang="en-NL"/>
           </a:p>
@@ -3910,8 +3926,8 @@
         </p:nvSpPr>
         <p:spPr>
           <a:xfrm>
-            <a:off x="8699253" y="39433605"/>
-            <a:ext cx="6438353" cy="2459914"/>
+            <a:off x="8610762" y="39433605"/>
+            <a:ext cx="7172497" cy="2459914"/>
           </a:xfrm>
           <a:prstGeom prst="rect">
             <a:avLst/>
@@ -3959,7 +3975,7 @@
                 <a:ea typeface="Helvetica Neue" panose="02000503000000020004" pitchFamily="2" charset="0"/>
                 <a:cs typeface="Helvetica Neue" panose="02000503000000020004" pitchFamily="2" charset="0"/>
               </a:rPr>
-              <a:t>Institute of Life Sciene &amp; Tech</a:t>
+              <a:t>Institute for Life Science &amp; Technology</a:t>
             </a:r>
           </a:p>
           <a:p>
@@ -3991,7 +4007,7 @@
         </p:nvCxnSpPr>
         <p:spPr>
           <a:xfrm>
-            <a:off x="8512743" y="39619562"/>
+            <a:off x="8424252" y="39619562"/>
             <a:ext cx="0" cy="2088000"/>
           </a:xfrm>
           <a:prstGeom prst="line">

</xml_diff>